<commit_message>
Final edits to PIXm and minor update to MHDS
</commit_message>
<xml_diff>
--- a/MHDS/Diagrams.pptx
+++ b/MHDS/Diagrams.pptx
@@ -264,7 +264,7 @@
           <a:p>
             <a:fld id="{03431FED-738C-45FE-8DA9-95C611B1D2F8}" type="datetimeFigureOut">
               <a:rPr lang="en-US" smtClean="0"/>
-              <a:t>11/14/2019</a:t>
+              <a:t>11/19/2019</a:t>
             </a:fld>
             <a:endParaRPr lang="en-US"/>
           </a:p>
@@ -462,7 +462,7 @@
           <a:p>
             <a:fld id="{03431FED-738C-45FE-8DA9-95C611B1D2F8}" type="datetimeFigureOut">
               <a:rPr lang="en-US" smtClean="0"/>
-              <a:t>11/14/2019</a:t>
+              <a:t>11/19/2019</a:t>
             </a:fld>
             <a:endParaRPr lang="en-US"/>
           </a:p>
@@ -670,7 +670,7 @@
           <a:p>
             <a:fld id="{03431FED-738C-45FE-8DA9-95C611B1D2F8}" type="datetimeFigureOut">
               <a:rPr lang="en-US" smtClean="0"/>
-              <a:t>11/14/2019</a:t>
+              <a:t>11/19/2019</a:t>
             </a:fld>
             <a:endParaRPr lang="en-US"/>
           </a:p>
@@ -868,7 +868,7 @@
           <a:p>
             <a:fld id="{03431FED-738C-45FE-8DA9-95C611B1D2F8}" type="datetimeFigureOut">
               <a:rPr lang="en-US" smtClean="0"/>
-              <a:t>11/14/2019</a:t>
+              <a:t>11/19/2019</a:t>
             </a:fld>
             <a:endParaRPr lang="en-US"/>
           </a:p>
@@ -1143,7 +1143,7 @@
           <a:p>
             <a:fld id="{03431FED-738C-45FE-8DA9-95C611B1D2F8}" type="datetimeFigureOut">
               <a:rPr lang="en-US" smtClean="0"/>
-              <a:t>11/14/2019</a:t>
+              <a:t>11/19/2019</a:t>
             </a:fld>
             <a:endParaRPr lang="en-US"/>
           </a:p>
@@ -1408,7 +1408,7 @@
           <a:p>
             <a:fld id="{03431FED-738C-45FE-8DA9-95C611B1D2F8}" type="datetimeFigureOut">
               <a:rPr lang="en-US" smtClean="0"/>
-              <a:t>11/14/2019</a:t>
+              <a:t>11/19/2019</a:t>
             </a:fld>
             <a:endParaRPr lang="en-US"/>
           </a:p>
@@ -1820,7 +1820,7 @@
           <a:p>
             <a:fld id="{03431FED-738C-45FE-8DA9-95C611B1D2F8}" type="datetimeFigureOut">
               <a:rPr lang="en-US" smtClean="0"/>
-              <a:t>11/14/2019</a:t>
+              <a:t>11/19/2019</a:t>
             </a:fld>
             <a:endParaRPr lang="en-US"/>
           </a:p>
@@ -1961,7 +1961,7 @@
           <a:p>
             <a:fld id="{03431FED-738C-45FE-8DA9-95C611B1D2F8}" type="datetimeFigureOut">
               <a:rPr lang="en-US" smtClean="0"/>
-              <a:t>11/14/2019</a:t>
+              <a:t>11/19/2019</a:t>
             </a:fld>
             <a:endParaRPr lang="en-US"/>
           </a:p>
@@ -2074,7 +2074,7 @@
           <a:p>
             <a:fld id="{03431FED-738C-45FE-8DA9-95C611B1D2F8}" type="datetimeFigureOut">
               <a:rPr lang="en-US" smtClean="0"/>
-              <a:t>11/14/2019</a:t>
+              <a:t>11/19/2019</a:t>
             </a:fld>
             <a:endParaRPr lang="en-US"/>
           </a:p>
@@ -2385,7 +2385,7 @@
           <a:p>
             <a:fld id="{03431FED-738C-45FE-8DA9-95C611B1D2F8}" type="datetimeFigureOut">
               <a:rPr lang="en-US" smtClean="0"/>
-              <a:t>11/14/2019</a:t>
+              <a:t>11/19/2019</a:t>
             </a:fld>
             <a:endParaRPr lang="en-US"/>
           </a:p>
@@ -2673,7 +2673,7 @@
           <a:p>
             <a:fld id="{03431FED-738C-45FE-8DA9-95C611B1D2F8}" type="datetimeFigureOut">
               <a:rPr lang="en-US" smtClean="0"/>
-              <a:t>11/14/2019</a:t>
+              <a:t>11/19/2019</a:t>
             </a:fld>
             <a:endParaRPr lang="en-US"/>
           </a:p>
@@ -2914,7 +2914,7 @@
           <a:p>
             <a:fld id="{03431FED-738C-45FE-8DA9-95C611B1D2F8}" type="datetimeFigureOut">
               <a:rPr lang="en-US" smtClean="0"/>
-              <a:t>11/14/2019</a:t>
+              <a:t>11/19/2019</a:t>
             </a:fld>
             <a:endParaRPr lang="en-US"/>
           </a:p>
@@ -5226,7 +5226,7 @@
         <p:spPr>
           <a:xfrm>
             <a:off x="528687" y="566585"/>
-            <a:ext cx="2524259" cy="4247317"/>
+            <a:ext cx="2524259" cy="4524315"/>
           </a:xfrm>
           <a:prstGeom prst="rect">
             <a:avLst/>
@@ -5246,7 +5246,7 @@
           <a:p>
             <a:r>
               <a:rPr lang="en-US" dirty="0"/>
-              <a:t>Document Source</a:t>
+              <a:t>System that publishes Documents</a:t>
             </a:r>
           </a:p>
           <a:p>
@@ -6828,11 +6828,8 @@
           <a:p>
             <a:r>
               <a:rPr lang="en-US" dirty="0"/>
-              <a:t>Document Consumer</a:t>
-            </a:r>
-          </a:p>
-          <a:p>
-            <a:endParaRPr lang="en-US" dirty="0"/>
+              <a:t>System that consumes documents</a:t>
+            </a:r>
           </a:p>
           <a:p>
             <a:endParaRPr lang="en-US" dirty="0"/>
@@ -8397,7 +8394,7 @@
         <p:spPr>
           <a:xfrm>
             <a:off x="528687" y="626219"/>
-            <a:ext cx="2524259" cy="4247317"/>
+            <a:ext cx="2524259" cy="4524315"/>
           </a:xfrm>
           <a:prstGeom prst="rect">
             <a:avLst/>
@@ -8417,7 +8414,7 @@
           <a:p>
             <a:r>
               <a:rPr lang="en-US" dirty="0"/>
-              <a:t>Clinical Data Consumer</a:t>
+              <a:t>System that consumes clinical data elements</a:t>
             </a:r>
           </a:p>
           <a:p>

</xml_diff>

<commit_message>
updates from January 7th t-con. Approved for Public Comment.
</commit_message>
<xml_diff>
--- a/MHDS/Diagrams.pptx
+++ b/MHDS/Diagrams.pptx
@@ -263,7 +263,7 @@
           <a:p>
             <a:fld id="{03431FED-738C-45FE-8DA9-95C611B1D2F8}" type="datetimeFigureOut">
               <a:rPr lang="en-US" smtClean="0"/>
-              <a:t>12/16/2019</a:t>
+              <a:t>1/7/2020</a:t>
             </a:fld>
             <a:endParaRPr lang="en-US"/>
           </a:p>
@@ -461,7 +461,7 @@
           <a:p>
             <a:fld id="{03431FED-738C-45FE-8DA9-95C611B1D2F8}" type="datetimeFigureOut">
               <a:rPr lang="en-US" smtClean="0"/>
-              <a:t>12/16/2019</a:t>
+              <a:t>1/7/2020</a:t>
             </a:fld>
             <a:endParaRPr lang="en-US"/>
           </a:p>
@@ -669,7 +669,7 @@
           <a:p>
             <a:fld id="{03431FED-738C-45FE-8DA9-95C611B1D2F8}" type="datetimeFigureOut">
               <a:rPr lang="en-US" smtClean="0"/>
-              <a:t>12/16/2019</a:t>
+              <a:t>1/7/2020</a:t>
             </a:fld>
             <a:endParaRPr lang="en-US"/>
           </a:p>
@@ -867,7 +867,7 @@
           <a:p>
             <a:fld id="{03431FED-738C-45FE-8DA9-95C611B1D2F8}" type="datetimeFigureOut">
               <a:rPr lang="en-US" smtClean="0"/>
-              <a:t>12/16/2019</a:t>
+              <a:t>1/7/2020</a:t>
             </a:fld>
             <a:endParaRPr lang="en-US"/>
           </a:p>
@@ -1142,7 +1142,7 @@
           <a:p>
             <a:fld id="{03431FED-738C-45FE-8DA9-95C611B1D2F8}" type="datetimeFigureOut">
               <a:rPr lang="en-US" smtClean="0"/>
-              <a:t>12/16/2019</a:t>
+              <a:t>1/7/2020</a:t>
             </a:fld>
             <a:endParaRPr lang="en-US"/>
           </a:p>
@@ -1407,7 +1407,7 @@
           <a:p>
             <a:fld id="{03431FED-738C-45FE-8DA9-95C611B1D2F8}" type="datetimeFigureOut">
               <a:rPr lang="en-US" smtClean="0"/>
-              <a:t>12/16/2019</a:t>
+              <a:t>1/7/2020</a:t>
             </a:fld>
             <a:endParaRPr lang="en-US"/>
           </a:p>
@@ -1819,7 +1819,7 @@
           <a:p>
             <a:fld id="{03431FED-738C-45FE-8DA9-95C611B1D2F8}" type="datetimeFigureOut">
               <a:rPr lang="en-US" smtClean="0"/>
-              <a:t>12/16/2019</a:t>
+              <a:t>1/7/2020</a:t>
             </a:fld>
             <a:endParaRPr lang="en-US"/>
           </a:p>
@@ -1960,7 +1960,7 @@
           <a:p>
             <a:fld id="{03431FED-738C-45FE-8DA9-95C611B1D2F8}" type="datetimeFigureOut">
               <a:rPr lang="en-US" smtClean="0"/>
-              <a:t>12/16/2019</a:t>
+              <a:t>1/7/2020</a:t>
             </a:fld>
             <a:endParaRPr lang="en-US"/>
           </a:p>
@@ -2073,7 +2073,7 @@
           <a:p>
             <a:fld id="{03431FED-738C-45FE-8DA9-95C611B1D2F8}" type="datetimeFigureOut">
               <a:rPr lang="en-US" smtClean="0"/>
-              <a:t>12/16/2019</a:t>
+              <a:t>1/7/2020</a:t>
             </a:fld>
             <a:endParaRPr lang="en-US"/>
           </a:p>
@@ -2384,7 +2384,7 @@
           <a:p>
             <a:fld id="{03431FED-738C-45FE-8DA9-95C611B1D2F8}" type="datetimeFigureOut">
               <a:rPr lang="en-US" smtClean="0"/>
-              <a:t>12/16/2019</a:t>
+              <a:t>1/7/2020</a:t>
             </a:fld>
             <a:endParaRPr lang="en-US"/>
           </a:p>
@@ -2672,7 +2672,7 @@
           <a:p>
             <a:fld id="{03431FED-738C-45FE-8DA9-95C611B1D2F8}" type="datetimeFigureOut">
               <a:rPr lang="en-US" smtClean="0"/>
-              <a:t>12/16/2019</a:t>
+              <a:t>1/7/2020</a:t>
             </a:fld>
             <a:endParaRPr lang="en-US"/>
           </a:p>
@@ -2913,7 +2913,7 @@
           <a:p>
             <a:fld id="{03431FED-738C-45FE-8DA9-95C611B1D2F8}" type="datetimeFigureOut">
               <a:rPr lang="en-US" smtClean="0"/>
-              <a:t>12/16/2019</a:t>
+              <a:t>1/7/2020</a:t>
             </a:fld>
             <a:endParaRPr lang="en-US"/>
           </a:p>
@@ -3376,21 +3376,33 @@
           <a:p>
             <a:pPr algn="ctr"/>
             <a:r>
-              <a:rPr lang="en-US" b="1" dirty="0"/>
+              <a:rPr lang="en-US" sz="2000" b="1" dirty="0">
+                <a:solidFill>
+                  <a:schemeClr val="tx1"/>
+                </a:solidFill>
+              </a:rPr>
               <a:t>Compatible </a:t>
             </a:r>
           </a:p>
           <a:p>
             <a:pPr algn="ctr"/>
             <a:r>
-              <a:rPr lang="en-US" b="1" dirty="0"/>
+              <a:rPr lang="en-US" sz="2000" b="1" dirty="0">
+                <a:solidFill>
+                  <a:schemeClr val="tx1"/>
+                </a:solidFill>
+              </a:rPr>
               <a:t>But</a:t>
             </a:r>
           </a:p>
           <a:p>
             <a:pPr algn="ctr"/>
             <a:r>
-              <a:rPr lang="en-US" b="1" dirty="0"/>
+              <a:rPr lang="en-US" sz="2000" b="1" dirty="0">
+                <a:solidFill>
+                  <a:schemeClr val="tx1"/>
+                </a:solidFill>
+              </a:rPr>
               <a:t>Not Included</a:t>
             </a:r>
           </a:p>
@@ -3445,8 +3457,12 @@
           <a:p>
             <a:pPr algn="ctr"/>
             <a:r>
-              <a:rPr lang="en-US" b="1" dirty="0"/>
-              <a:t>HIE partner types</a:t>
+              <a:rPr lang="en-US" sz="2000" b="1" dirty="0">
+                <a:solidFill>
+                  <a:schemeClr val="tx1"/>
+                </a:solidFill>
+              </a:rPr>
+              <a:t>HIE client types</a:t>
             </a:r>
           </a:p>
         </p:txBody>
@@ -3494,7 +3510,11 @@
           <a:p>
             <a:pPr algn="ctr"/>
             <a:r>
-              <a:rPr lang="en-US" b="1" dirty="0"/>
+              <a:rPr lang="en-US" sz="2000" b="1" dirty="0">
+                <a:solidFill>
+                  <a:schemeClr val="tx1"/>
+                </a:solidFill>
+              </a:rPr>
               <a:t>Central Infrastructure</a:t>
             </a:r>
           </a:p>

</xml_diff>

<commit_message>
update MHDS for consent option
</commit_message>
<xml_diff>
--- a/MHDS/Diagrams.pptx
+++ b/MHDS/Diagrams.pptx
@@ -10,6 +10,8 @@
     <p:sldId id="259" r:id="rId4"/>
     <p:sldId id="260" r:id="rId5"/>
     <p:sldId id="261" r:id="rId6"/>
+    <p:sldId id="274" r:id="rId7"/>
+    <p:sldId id="275" r:id="rId8"/>
   </p:sldIdLst>
   <p:sldSz cx="12192000" cy="6858000"/>
   <p:notesSz cx="6858000" cy="9144000"/>
@@ -263,7 +265,7 @@
           <a:p>
             <a:fld id="{03431FED-738C-45FE-8DA9-95C611B1D2F8}" type="datetimeFigureOut">
               <a:rPr lang="en-US" smtClean="0"/>
-              <a:t>1/7/2020</a:t>
+              <a:t>2/18/2020</a:t>
             </a:fld>
             <a:endParaRPr lang="en-US"/>
           </a:p>
@@ -461,7 +463,7 @@
           <a:p>
             <a:fld id="{03431FED-738C-45FE-8DA9-95C611B1D2F8}" type="datetimeFigureOut">
               <a:rPr lang="en-US" smtClean="0"/>
-              <a:t>1/7/2020</a:t>
+              <a:t>2/18/2020</a:t>
             </a:fld>
             <a:endParaRPr lang="en-US"/>
           </a:p>
@@ -669,7 +671,7 @@
           <a:p>
             <a:fld id="{03431FED-738C-45FE-8DA9-95C611B1D2F8}" type="datetimeFigureOut">
               <a:rPr lang="en-US" smtClean="0"/>
-              <a:t>1/7/2020</a:t>
+              <a:t>2/18/2020</a:t>
             </a:fld>
             <a:endParaRPr lang="en-US"/>
           </a:p>
@@ -867,7 +869,7 @@
           <a:p>
             <a:fld id="{03431FED-738C-45FE-8DA9-95C611B1D2F8}" type="datetimeFigureOut">
               <a:rPr lang="en-US" smtClean="0"/>
-              <a:t>1/7/2020</a:t>
+              <a:t>2/18/2020</a:t>
             </a:fld>
             <a:endParaRPr lang="en-US"/>
           </a:p>
@@ -1142,7 +1144,7 @@
           <a:p>
             <a:fld id="{03431FED-738C-45FE-8DA9-95C611B1D2F8}" type="datetimeFigureOut">
               <a:rPr lang="en-US" smtClean="0"/>
-              <a:t>1/7/2020</a:t>
+              <a:t>2/18/2020</a:t>
             </a:fld>
             <a:endParaRPr lang="en-US"/>
           </a:p>
@@ -1407,7 +1409,7 @@
           <a:p>
             <a:fld id="{03431FED-738C-45FE-8DA9-95C611B1D2F8}" type="datetimeFigureOut">
               <a:rPr lang="en-US" smtClean="0"/>
-              <a:t>1/7/2020</a:t>
+              <a:t>2/18/2020</a:t>
             </a:fld>
             <a:endParaRPr lang="en-US"/>
           </a:p>
@@ -1819,7 +1821,7 @@
           <a:p>
             <a:fld id="{03431FED-738C-45FE-8DA9-95C611B1D2F8}" type="datetimeFigureOut">
               <a:rPr lang="en-US" smtClean="0"/>
-              <a:t>1/7/2020</a:t>
+              <a:t>2/18/2020</a:t>
             </a:fld>
             <a:endParaRPr lang="en-US"/>
           </a:p>
@@ -1960,7 +1962,7 @@
           <a:p>
             <a:fld id="{03431FED-738C-45FE-8DA9-95C611B1D2F8}" type="datetimeFigureOut">
               <a:rPr lang="en-US" smtClean="0"/>
-              <a:t>1/7/2020</a:t>
+              <a:t>2/18/2020</a:t>
             </a:fld>
             <a:endParaRPr lang="en-US"/>
           </a:p>
@@ -2073,7 +2075,7 @@
           <a:p>
             <a:fld id="{03431FED-738C-45FE-8DA9-95C611B1D2F8}" type="datetimeFigureOut">
               <a:rPr lang="en-US" smtClean="0"/>
-              <a:t>1/7/2020</a:t>
+              <a:t>2/18/2020</a:t>
             </a:fld>
             <a:endParaRPr lang="en-US"/>
           </a:p>
@@ -2384,7 +2386,7 @@
           <a:p>
             <a:fld id="{03431FED-738C-45FE-8DA9-95C611B1D2F8}" type="datetimeFigureOut">
               <a:rPr lang="en-US" smtClean="0"/>
-              <a:t>1/7/2020</a:t>
+              <a:t>2/18/2020</a:t>
             </a:fld>
             <a:endParaRPr lang="en-US"/>
           </a:p>
@@ -2672,7 +2674,7 @@
           <a:p>
             <a:fld id="{03431FED-738C-45FE-8DA9-95C611B1D2F8}" type="datetimeFigureOut">
               <a:rPr lang="en-US" smtClean="0"/>
-              <a:t>1/7/2020</a:t>
+              <a:t>2/18/2020</a:t>
             </a:fld>
             <a:endParaRPr lang="en-US"/>
           </a:p>
@@ -2913,7 +2915,7 @@
           <a:p>
             <a:fld id="{03431FED-738C-45FE-8DA9-95C611B1D2F8}" type="datetimeFigureOut">
               <a:rPr lang="en-US" smtClean="0"/>
-              <a:t>1/7/2020</a:t>
+              <a:t>2/18/2020</a:t>
             </a:fld>
             <a:endParaRPr lang="en-US"/>
           </a:p>
@@ -9480,6 +9482,796 @@
 </p:sld>
 </file>
 
+<file path=ppt/slides/slide6.xml><?xml version="1.0" encoding="utf-8"?>
+<p:sld xmlns:a="http://schemas.openxmlformats.org/drawingml/2006/main" xmlns:r="http://schemas.openxmlformats.org/officeDocument/2006/relationships" xmlns:p="http://schemas.openxmlformats.org/presentationml/2006/main">
+  <p:cSld>
+    <p:spTree>
+      <p:nvGrpSpPr>
+        <p:cNvPr id="1" name=""/>
+        <p:cNvGrpSpPr/>
+        <p:nvPr/>
+      </p:nvGrpSpPr>
+      <p:grpSpPr>
+        <a:xfrm>
+          <a:off x="0" y="0"/>
+          <a:ext cx="0" cy="0"/>
+          <a:chOff x="0" y="0"/>
+          <a:chExt cx="0" cy="0"/>
+        </a:xfrm>
+      </p:grpSpPr>
+      <p:sp>
+        <p:nvSpPr>
+          <p:cNvPr id="2" name="Oval 1"/>
+          <p:cNvSpPr/>
+          <p:nvPr/>
+        </p:nvSpPr>
+        <p:spPr bwMode="auto">
+          <a:xfrm>
+            <a:off x="2988866" y="3662081"/>
+            <a:ext cx="1730033" cy="1833650"/>
+          </a:xfrm>
+          <a:prstGeom prst="ellipse">
+            <a:avLst/>
+          </a:prstGeom>
+          <a:solidFill>
+            <a:srgbClr val="00B050"/>
+          </a:solidFill>
+          <a:ln w="9525" cap="flat" cmpd="sng" algn="ctr">
+            <a:solidFill>
+              <a:srgbClr val="002060"/>
+            </a:solidFill>
+            <a:prstDash val="solid"/>
+            <a:round/>
+            <a:headEnd type="none" w="med" len="med"/>
+            <a:tailEnd type="none" w="med" len="med"/>
+          </a:ln>
+          <a:effectLst/>
+        </p:spPr>
+        <p:txBody>
+          <a:bodyPr vert="horz" wrap="square" lIns="91440" tIns="45720" rIns="91440" bIns="45720" numCol="1" rtlCol="0" anchor="ctr" anchorCtr="0" compatLnSpc="1">
+            <a:prstTxWarp prst="textNoShape">
+              <a:avLst/>
+            </a:prstTxWarp>
+          </a:bodyPr>
+          <a:lstStyle/>
+          <a:p>
+            <a:pPr algn="ctr" eaLnBrk="0" fontAlgn="base" hangingPunct="0">
+              <a:spcBef>
+                <a:spcPct val="0"/>
+              </a:spcBef>
+              <a:spcAft>
+                <a:spcPct val="0"/>
+              </a:spcAft>
+            </a:pPr>
+            <a:r>
+              <a:rPr lang="en-US" sz="2800" dirty="0">
+                <a:solidFill>
+                  <a:srgbClr val="002060"/>
+                </a:solidFill>
+                <a:latin typeface="GE Inspira Pitch" pitchFamily="34" charset="0"/>
+              </a:rPr>
+              <a:t>Permit</a:t>
+            </a:r>
+            <a:endParaRPr lang="en-US" sz="1600" dirty="0">
+              <a:solidFill>
+                <a:srgbClr val="002060"/>
+              </a:solidFill>
+              <a:latin typeface="GE Inspira Pitch" pitchFamily="34" charset="0"/>
+            </a:endParaRPr>
+          </a:p>
+        </p:txBody>
+      </p:sp>
+      <p:sp>
+        <p:nvSpPr>
+          <p:cNvPr id="5" name="Oval 4"/>
+          <p:cNvSpPr/>
+          <p:nvPr/>
+        </p:nvSpPr>
+        <p:spPr bwMode="auto">
+          <a:xfrm>
+            <a:off x="7639166" y="3662081"/>
+            <a:ext cx="1713219" cy="1833648"/>
+          </a:xfrm>
+          <a:prstGeom prst="ellipse">
+            <a:avLst/>
+          </a:prstGeom>
+          <a:solidFill>
+            <a:srgbClr val="FF0000"/>
+          </a:solidFill>
+          <a:ln w="9525" cap="flat" cmpd="sng" algn="ctr">
+            <a:solidFill>
+              <a:srgbClr val="002060"/>
+            </a:solidFill>
+            <a:prstDash val="solid"/>
+            <a:round/>
+            <a:headEnd type="none" w="med" len="med"/>
+            <a:tailEnd type="none" w="med" len="med"/>
+          </a:ln>
+          <a:effectLst/>
+        </p:spPr>
+        <p:txBody>
+          <a:bodyPr vert="horz" wrap="square" lIns="91440" tIns="45720" rIns="91440" bIns="45720" numCol="1" rtlCol="0" anchor="ctr" anchorCtr="0" compatLnSpc="1">
+            <a:prstTxWarp prst="textNoShape">
+              <a:avLst/>
+            </a:prstTxWarp>
+          </a:bodyPr>
+          <a:lstStyle/>
+          <a:p>
+            <a:pPr algn="ctr" eaLnBrk="0" fontAlgn="base" hangingPunct="0">
+              <a:spcBef>
+                <a:spcPct val="0"/>
+              </a:spcBef>
+              <a:spcAft>
+                <a:spcPct val="0"/>
+              </a:spcAft>
+            </a:pPr>
+            <a:r>
+              <a:rPr lang="en-US" sz="2800" dirty="0">
+                <a:solidFill>
+                  <a:srgbClr val="002060"/>
+                </a:solidFill>
+                <a:latin typeface="GE Inspira Pitch" pitchFamily="34" charset="0"/>
+              </a:rPr>
+              <a:t>Deny</a:t>
+            </a:r>
+            <a:endParaRPr lang="en-US" sz="1000" dirty="0">
+              <a:solidFill>
+                <a:srgbClr val="002060"/>
+              </a:solidFill>
+              <a:latin typeface="GE Inspira Pitch" pitchFamily="34" charset="0"/>
+            </a:endParaRPr>
+          </a:p>
+        </p:txBody>
+      </p:sp>
+      <p:cxnSp>
+        <p:nvCxnSpPr>
+          <p:cNvPr id="6" name="Connector: Curved 5"/>
+          <p:cNvCxnSpPr>
+            <a:cxnSpLocks/>
+            <a:stCxn id="2" idx="7"/>
+            <a:endCxn id="5" idx="1"/>
+          </p:cNvCxnSpPr>
+          <p:nvPr/>
+        </p:nvCxnSpPr>
+        <p:spPr bwMode="auto">
+          <a:xfrm rot="5400000" flipH="1" flipV="1">
+            <a:off x="6177800" y="2218355"/>
+            <a:ext cx="12700" cy="3424519"/>
+          </a:xfrm>
+          <a:prstGeom prst="curvedConnector3">
+            <a:avLst>
+              <a:gd name="adj1" fmla="val 3914425"/>
+            </a:avLst>
+          </a:prstGeom>
+          <a:solidFill>
+            <a:schemeClr val="accent1"/>
+          </a:solidFill>
+          <a:ln w="9525" cap="flat" cmpd="sng" algn="ctr">
+            <a:solidFill>
+              <a:schemeClr val="tx1"/>
+            </a:solidFill>
+            <a:prstDash val="solid"/>
+            <a:round/>
+            <a:headEnd type="none" w="med" len="med"/>
+            <a:tailEnd type="triangle" w="lg" len="lg"/>
+          </a:ln>
+          <a:effectLst/>
+          <a:extLst>
+            <a:ext uri="{AF507438-7753-43E0-B8FC-AC1667EBCBE1}">
+              <a14:hiddenEffects xmlns:a14="http://schemas.microsoft.com/office/drawing/2010/main">
+                <a:effectLst>
+                  <a:outerShdw dist="35921" dir="2700000" algn="ctr" rotWithShape="0">
+                    <a:schemeClr val="bg2"/>
+                  </a:outerShdw>
+                </a:effectLst>
+              </a14:hiddenEffects>
+            </a:ext>
+          </a:extLst>
+        </p:spPr>
+      </p:cxnSp>
+      <p:cxnSp>
+        <p:nvCxnSpPr>
+          <p:cNvPr id="9" name="Connector: Curved 8"/>
+          <p:cNvCxnSpPr>
+            <a:stCxn id="5" idx="3"/>
+            <a:endCxn id="2" idx="5"/>
+          </p:cNvCxnSpPr>
+          <p:nvPr/>
+        </p:nvCxnSpPr>
+        <p:spPr bwMode="auto">
+          <a:xfrm rot="5400000">
+            <a:off x="6177800" y="3514940"/>
+            <a:ext cx="2" cy="3424519"/>
+          </a:xfrm>
+          <a:prstGeom prst="curvedConnector3">
+            <a:avLst>
+              <a:gd name="adj1" fmla="val 24856700000"/>
+            </a:avLst>
+          </a:prstGeom>
+          <a:solidFill>
+            <a:schemeClr val="accent1"/>
+          </a:solidFill>
+          <a:ln w="9525" cap="flat" cmpd="sng" algn="ctr">
+            <a:solidFill>
+              <a:schemeClr val="tx1"/>
+            </a:solidFill>
+            <a:prstDash val="solid"/>
+            <a:round/>
+            <a:headEnd type="none" w="med" len="med"/>
+            <a:tailEnd type="triangle" w="lg" len="lg"/>
+          </a:ln>
+          <a:effectLst/>
+          <a:extLst>
+            <a:ext uri="{AF507438-7753-43E0-B8FC-AC1667EBCBE1}">
+              <a14:hiddenEffects xmlns:a14="http://schemas.microsoft.com/office/drawing/2010/main">
+                <a:effectLst>
+                  <a:outerShdw dist="35921" dir="2700000" algn="ctr" rotWithShape="0">
+                    <a:schemeClr val="bg2"/>
+                  </a:outerShdw>
+                </a:effectLst>
+              </a14:hiddenEffects>
+            </a:ext>
+          </a:extLst>
+        </p:spPr>
+      </p:cxnSp>
+      <p:cxnSp>
+        <p:nvCxnSpPr>
+          <p:cNvPr id="7" name="Straight Arrow Connector 6"/>
+          <p:cNvCxnSpPr/>
+          <p:nvPr/>
+        </p:nvCxnSpPr>
+        <p:spPr bwMode="auto">
+          <a:xfrm>
+            <a:off x="8444733" y="2179320"/>
+            <a:ext cx="0" cy="1482762"/>
+          </a:xfrm>
+          <a:prstGeom prst="straightConnector1">
+            <a:avLst/>
+          </a:prstGeom>
+          <a:solidFill>
+            <a:schemeClr val="accent1"/>
+          </a:solidFill>
+          <a:ln w="25400" cap="flat" cmpd="sng" algn="ctr">
+            <a:solidFill>
+              <a:schemeClr val="tx1"/>
+            </a:solidFill>
+            <a:prstDash val="solid"/>
+            <a:round/>
+            <a:headEnd type="oval" w="med" len="med"/>
+            <a:tailEnd type="arrow" w="lg" len="lg"/>
+          </a:ln>
+          <a:effectLst/>
+          <a:extLst>
+            <a:ext uri="{AF507438-7753-43E0-B8FC-AC1667EBCBE1}">
+              <a14:hiddenEffects xmlns:a14="http://schemas.microsoft.com/office/drawing/2010/main">
+                <a:effectLst>
+                  <a:outerShdw dist="35921" dir="2700000" algn="ctr" rotWithShape="0">
+                    <a:schemeClr val="bg2"/>
+                  </a:outerShdw>
+                </a:effectLst>
+              </a14:hiddenEffects>
+            </a:ext>
+          </a:extLst>
+        </p:spPr>
+      </p:cxnSp>
+      <p:sp>
+        <p:nvSpPr>
+          <p:cNvPr id="8" name="TextBox 7"/>
+          <p:cNvSpPr txBox="1"/>
+          <p:nvPr/>
+        </p:nvSpPr>
+        <p:spPr>
+          <a:xfrm>
+            <a:off x="7973645" y="1532988"/>
+            <a:ext cx="1044260" cy="646331"/>
+          </a:xfrm>
+          <a:prstGeom prst="rect">
+            <a:avLst/>
+          </a:prstGeom>
+          <a:noFill/>
+        </p:spPr>
+        <p:txBody>
+          <a:bodyPr wrap="none" rtlCol="0">
+            <a:spAutoFit/>
+          </a:bodyPr>
+          <a:lstStyle/>
+          <a:p>
+            <a:r>
+              <a:rPr lang="en-US" sz="3600" dirty="0"/>
+              <a:t>start</a:t>
+            </a:r>
+          </a:p>
+        </p:txBody>
+      </p:sp>
+      <p:sp>
+        <p:nvSpPr>
+          <p:cNvPr id="3" name="Title 2"/>
+          <p:cNvSpPr>
+            <a:spLocks noGrp="1"/>
+          </p:cNvSpPr>
+          <p:nvPr>
+            <p:ph type="title"/>
+          </p:nvPr>
+        </p:nvSpPr>
+        <p:spPr/>
+        <p:txBody>
+          <a:bodyPr/>
+          <a:lstStyle/>
+          <a:p>
+            <a:pPr algn="ctr"/>
+            <a:r>
+              <a:rPr lang="en-US" dirty="0"/>
+              <a:t>Explicit Consent</a:t>
+            </a:r>
+          </a:p>
+        </p:txBody>
+      </p:sp>
+      <p:sp>
+        <p:nvSpPr>
+          <p:cNvPr id="10" name="TextBox 9"/>
+          <p:cNvSpPr txBox="1"/>
+          <p:nvPr/>
+        </p:nvSpPr>
+        <p:spPr>
+          <a:xfrm>
+            <a:off x="5313718" y="2916010"/>
+            <a:ext cx="856004" cy="369332"/>
+          </a:xfrm>
+          <a:prstGeom prst="rect">
+            <a:avLst/>
+          </a:prstGeom>
+          <a:noFill/>
+        </p:spPr>
+        <p:txBody>
+          <a:bodyPr wrap="none" rtlCol="0">
+            <a:spAutoFit/>
+          </a:bodyPr>
+          <a:lstStyle/>
+          <a:p>
+            <a:r>
+              <a:rPr lang="en-US" dirty="0"/>
+              <a:t>Revoke</a:t>
+            </a:r>
+          </a:p>
+        </p:txBody>
+      </p:sp>
+      <p:sp>
+        <p:nvSpPr>
+          <p:cNvPr id="11" name="TextBox 10"/>
+          <p:cNvSpPr txBox="1"/>
+          <p:nvPr/>
+        </p:nvSpPr>
+        <p:spPr>
+          <a:xfrm>
+            <a:off x="5451371" y="5227197"/>
+            <a:ext cx="1094787" cy="369332"/>
+          </a:xfrm>
+          <a:prstGeom prst="rect">
+            <a:avLst/>
+          </a:prstGeom>
+          <a:noFill/>
+        </p:spPr>
+        <p:txBody>
+          <a:bodyPr wrap="none" rtlCol="0">
+            <a:spAutoFit/>
+          </a:bodyPr>
+          <a:lstStyle/>
+          <a:p>
+            <a:r>
+              <a:rPr lang="en-US" dirty="0"/>
+              <a:t>Authorize</a:t>
+            </a:r>
+          </a:p>
+        </p:txBody>
+      </p:sp>
+    </p:spTree>
+    <p:extLst>
+      <p:ext uri="{BB962C8B-B14F-4D97-AF65-F5344CB8AC3E}">
+        <p14:creationId xmlns:p14="http://schemas.microsoft.com/office/powerpoint/2010/main" val="1989594453"/>
+      </p:ext>
+    </p:extLst>
+  </p:cSld>
+  <p:clrMapOvr>
+    <a:masterClrMapping/>
+  </p:clrMapOvr>
+</p:sld>
+</file>
+
+<file path=ppt/slides/slide7.xml><?xml version="1.0" encoding="utf-8"?>
+<p:sld xmlns:a="http://schemas.openxmlformats.org/drawingml/2006/main" xmlns:r="http://schemas.openxmlformats.org/officeDocument/2006/relationships" xmlns:p="http://schemas.openxmlformats.org/presentationml/2006/main">
+  <p:cSld>
+    <p:spTree>
+      <p:nvGrpSpPr>
+        <p:cNvPr id="1" name=""/>
+        <p:cNvGrpSpPr/>
+        <p:nvPr/>
+      </p:nvGrpSpPr>
+      <p:grpSpPr>
+        <a:xfrm>
+          <a:off x="0" y="0"/>
+          <a:ext cx="0" cy="0"/>
+          <a:chOff x="0" y="0"/>
+          <a:chExt cx="0" cy="0"/>
+        </a:xfrm>
+      </p:grpSpPr>
+      <p:sp>
+        <p:nvSpPr>
+          <p:cNvPr id="2" name="Oval 1"/>
+          <p:cNvSpPr/>
+          <p:nvPr/>
+        </p:nvSpPr>
+        <p:spPr bwMode="auto">
+          <a:xfrm>
+            <a:off x="2988866" y="3662081"/>
+            <a:ext cx="1730033" cy="1833650"/>
+          </a:xfrm>
+          <a:prstGeom prst="ellipse">
+            <a:avLst/>
+          </a:prstGeom>
+          <a:solidFill>
+            <a:srgbClr val="00B050"/>
+          </a:solidFill>
+          <a:ln w="9525" cap="flat" cmpd="sng" algn="ctr">
+            <a:solidFill>
+              <a:srgbClr val="002060"/>
+            </a:solidFill>
+            <a:prstDash val="solid"/>
+            <a:round/>
+            <a:headEnd type="none" w="med" len="med"/>
+            <a:tailEnd type="none" w="med" len="med"/>
+          </a:ln>
+          <a:effectLst/>
+        </p:spPr>
+        <p:txBody>
+          <a:bodyPr vert="horz" wrap="square" lIns="91440" tIns="45720" rIns="91440" bIns="45720" numCol="1" rtlCol="0" anchor="ctr" anchorCtr="0" compatLnSpc="1">
+            <a:prstTxWarp prst="textNoShape">
+              <a:avLst/>
+            </a:prstTxWarp>
+          </a:bodyPr>
+          <a:lstStyle/>
+          <a:p>
+            <a:pPr algn="ctr" eaLnBrk="0" fontAlgn="base" hangingPunct="0">
+              <a:spcBef>
+                <a:spcPct val="0"/>
+              </a:spcBef>
+              <a:spcAft>
+                <a:spcPct val="0"/>
+              </a:spcAft>
+            </a:pPr>
+            <a:r>
+              <a:rPr lang="en-US" sz="2800" dirty="0">
+                <a:solidFill>
+                  <a:srgbClr val="002060"/>
+                </a:solidFill>
+                <a:latin typeface="GE Inspira Pitch" pitchFamily="34" charset="0"/>
+              </a:rPr>
+              <a:t>Permit</a:t>
+            </a:r>
+            <a:endParaRPr lang="en-US" sz="1600" dirty="0">
+              <a:solidFill>
+                <a:srgbClr val="002060"/>
+              </a:solidFill>
+              <a:latin typeface="GE Inspira Pitch" pitchFamily="34" charset="0"/>
+            </a:endParaRPr>
+          </a:p>
+        </p:txBody>
+      </p:sp>
+      <p:sp>
+        <p:nvSpPr>
+          <p:cNvPr id="5" name="Oval 4"/>
+          <p:cNvSpPr/>
+          <p:nvPr/>
+        </p:nvSpPr>
+        <p:spPr bwMode="auto">
+          <a:xfrm>
+            <a:off x="7639166" y="3662081"/>
+            <a:ext cx="1713219" cy="1833648"/>
+          </a:xfrm>
+          <a:prstGeom prst="ellipse">
+            <a:avLst/>
+          </a:prstGeom>
+          <a:solidFill>
+            <a:srgbClr val="FF0000"/>
+          </a:solidFill>
+          <a:ln w="9525" cap="flat" cmpd="sng" algn="ctr">
+            <a:solidFill>
+              <a:srgbClr val="002060"/>
+            </a:solidFill>
+            <a:prstDash val="solid"/>
+            <a:round/>
+            <a:headEnd type="none" w="med" len="med"/>
+            <a:tailEnd type="none" w="med" len="med"/>
+          </a:ln>
+          <a:effectLst/>
+        </p:spPr>
+        <p:txBody>
+          <a:bodyPr vert="horz" wrap="square" lIns="91440" tIns="45720" rIns="91440" bIns="45720" numCol="1" rtlCol="0" anchor="ctr" anchorCtr="0" compatLnSpc="1">
+            <a:prstTxWarp prst="textNoShape">
+              <a:avLst/>
+            </a:prstTxWarp>
+          </a:bodyPr>
+          <a:lstStyle/>
+          <a:p>
+            <a:pPr algn="ctr" eaLnBrk="0" fontAlgn="base" hangingPunct="0">
+              <a:spcBef>
+                <a:spcPct val="0"/>
+              </a:spcBef>
+              <a:spcAft>
+                <a:spcPct val="0"/>
+              </a:spcAft>
+            </a:pPr>
+            <a:r>
+              <a:rPr lang="en-US" sz="2800" dirty="0">
+                <a:solidFill>
+                  <a:srgbClr val="002060"/>
+                </a:solidFill>
+                <a:latin typeface="GE Inspira Pitch" pitchFamily="34" charset="0"/>
+              </a:rPr>
+              <a:t>Deny</a:t>
+            </a:r>
+            <a:endParaRPr lang="en-US" sz="1000" dirty="0">
+              <a:solidFill>
+                <a:srgbClr val="002060"/>
+              </a:solidFill>
+              <a:latin typeface="GE Inspira Pitch" pitchFamily="34" charset="0"/>
+            </a:endParaRPr>
+          </a:p>
+        </p:txBody>
+      </p:sp>
+      <p:cxnSp>
+        <p:nvCxnSpPr>
+          <p:cNvPr id="6" name="Connector: Curved 5"/>
+          <p:cNvCxnSpPr>
+            <a:cxnSpLocks/>
+            <a:stCxn id="2" idx="7"/>
+            <a:endCxn id="5" idx="1"/>
+          </p:cNvCxnSpPr>
+          <p:nvPr/>
+        </p:nvCxnSpPr>
+        <p:spPr bwMode="auto">
+          <a:xfrm rot="5400000" flipH="1" flipV="1">
+            <a:off x="6177800" y="2218355"/>
+            <a:ext cx="12700" cy="3424519"/>
+          </a:xfrm>
+          <a:prstGeom prst="curvedConnector3">
+            <a:avLst>
+              <a:gd name="adj1" fmla="val 3914425"/>
+            </a:avLst>
+          </a:prstGeom>
+          <a:solidFill>
+            <a:schemeClr val="accent1"/>
+          </a:solidFill>
+          <a:ln w="9525" cap="flat" cmpd="sng" algn="ctr">
+            <a:solidFill>
+              <a:schemeClr val="tx1"/>
+            </a:solidFill>
+            <a:prstDash val="solid"/>
+            <a:round/>
+            <a:headEnd type="none" w="med" len="med"/>
+            <a:tailEnd type="triangle" w="lg" len="lg"/>
+          </a:ln>
+          <a:effectLst/>
+          <a:extLst>
+            <a:ext uri="{AF507438-7753-43E0-B8FC-AC1667EBCBE1}">
+              <a14:hiddenEffects xmlns:a14="http://schemas.microsoft.com/office/drawing/2010/main">
+                <a:effectLst>
+                  <a:outerShdw dist="35921" dir="2700000" algn="ctr" rotWithShape="0">
+                    <a:schemeClr val="bg2"/>
+                  </a:outerShdw>
+                </a:effectLst>
+              </a14:hiddenEffects>
+            </a:ext>
+          </a:extLst>
+        </p:spPr>
+      </p:cxnSp>
+      <p:cxnSp>
+        <p:nvCxnSpPr>
+          <p:cNvPr id="9" name="Connector: Curved 8"/>
+          <p:cNvCxnSpPr>
+            <a:stCxn id="5" idx="3"/>
+            <a:endCxn id="2" idx="5"/>
+          </p:cNvCxnSpPr>
+          <p:nvPr/>
+        </p:nvCxnSpPr>
+        <p:spPr bwMode="auto">
+          <a:xfrm rot="5400000">
+            <a:off x="6177800" y="3514940"/>
+            <a:ext cx="2" cy="3424519"/>
+          </a:xfrm>
+          <a:prstGeom prst="curvedConnector3">
+            <a:avLst>
+              <a:gd name="adj1" fmla="val 24856700000"/>
+            </a:avLst>
+          </a:prstGeom>
+          <a:solidFill>
+            <a:schemeClr val="accent1"/>
+          </a:solidFill>
+          <a:ln w="9525" cap="flat" cmpd="sng" algn="ctr">
+            <a:solidFill>
+              <a:schemeClr val="tx1"/>
+            </a:solidFill>
+            <a:prstDash val="solid"/>
+            <a:round/>
+            <a:headEnd type="none" w="med" len="med"/>
+            <a:tailEnd type="triangle" w="lg" len="lg"/>
+          </a:ln>
+          <a:effectLst/>
+          <a:extLst>
+            <a:ext uri="{AF507438-7753-43E0-B8FC-AC1667EBCBE1}">
+              <a14:hiddenEffects xmlns:a14="http://schemas.microsoft.com/office/drawing/2010/main">
+                <a:effectLst>
+                  <a:outerShdw dist="35921" dir="2700000" algn="ctr" rotWithShape="0">
+                    <a:schemeClr val="bg2"/>
+                  </a:outerShdw>
+                </a:effectLst>
+              </a14:hiddenEffects>
+            </a:ext>
+          </a:extLst>
+        </p:spPr>
+      </p:cxnSp>
+      <p:cxnSp>
+        <p:nvCxnSpPr>
+          <p:cNvPr id="7" name="Straight Arrow Connector 6"/>
+          <p:cNvCxnSpPr/>
+          <p:nvPr/>
+        </p:nvCxnSpPr>
+        <p:spPr bwMode="auto">
+          <a:xfrm>
+            <a:off x="3881435" y="2403429"/>
+            <a:ext cx="0" cy="1258653"/>
+          </a:xfrm>
+          <a:prstGeom prst="straightConnector1">
+            <a:avLst/>
+          </a:prstGeom>
+          <a:solidFill>
+            <a:schemeClr val="accent1"/>
+          </a:solidFill>
+          <a:ln w="25400" cap="flat" cmpd="sng" algn="ctr">
+            <a:solidFill>
+              <a:schemeClr val="tx1"/>
+            </a:solidFill>
+            <a:prstDash val="solid"/>
+            <a:round/>
+            <a:headEnd type="oval" w="med" len="med"/>
+            <a:tailEnd type="arrow" w="lg" len="lg"/>
+          </a:ln>
+          <a:effectLst/>
+          <a:extLst>
+            <a:ext uri="{AF507438-7753-43E0-B8FC-AC1667EBCBE1}">
+              <a14:hiddenEffects xmlns:a14="http://schemas.microsoft.com/office/drawing/2010/main">
+                <a:effectLst>
+                  <a:outerShdw dist="35921" dir="2700000" algn="ctr" rotWithShape="0">
+                    <a:schemeClr val="bg2"/>
+                  </a:outerShdw>
+                </a:effectLst>
+              </a14:hiddenEffects>
+            </a:ext>
+          </a:extLst>
+        </p:spPr>
+      </p:cxnSp>
+      <p:sp>
+        <p:nvSpPr>
+          <p:cNvPr id="8" name="TextBox 7"/>
+          <p:cNvSpPr txBox="1"/>
+          <p:nvPr/>
+        </p:nvSpPr>
+        <p:spPr>
+          <a:xfrm>
+            <a:off x="3331752" y="1706888"/>
+            <a:ext cx="1044260" cy="646331"/>
+          </a:xfrm>
+          <a:prstGeom prst="rect">
+            <a:avLst/>
+          </a:prstGeom>
+          <a:noFill/>
+        </p:spPr>
+        <p:txBody>
+          <a:bodyPr wrap="none" rtlCol="0">
+            <a:spAutoFit/>
+          </a:bodyPr>
+          <a:lstStyle/>
+          <a:p>
+            <a:r>
+              <a:rPr lang="en-US" sz="3600" dirty="0"/>
+              <a:t>start</a:t>
+            </a:r>
+          </a:p>
+        </p:txBody>
+      </p:sp>
+      <p:sp>
+        <p:nvSpPr>
+          <p:cNvPr id="10" name="TextBox 9"/>
+          <p:cNvSpPr txBox="1"/>
+          <p:nvPr/>
+        </p:nvSpPr>
+        <p:spPr>
+          <a:xfrm>
+            <a:off x="5313718" y="2916010"/>
+            <a:ext cx="856004" cy="369332"/>
+          </a:xfrm>
+          <a:prstGeom prst="rect">
+            <a:avLst/>
+          </a:prstGeom>
+          <a:noFill/>
+        </p:spPr>
+        <p:txBody>
+          <a:bodyPr wrap="none" rtlCol="0">
+            <a:spAutoFit/>
+          </a:bodyPr>
+          <a:lstStyle/>
+          <a:p>
+            <a:r>
+              <a:rPr lang="en-US" dirty="0"/>
+              <a:t>Revoke</a:t>
+            </a:r>
+          </a:p>
+        </p:txBody>
+      </p:sp>
+      <p:sp>
+        <p:nvSpPr>
+          <p:cNvPr id="11" name="TextBox 10"/>
+          <p:cNvSpPr txBox="1"/>
+          <p:nvPr/>
+        </p:nvSpPr>
+        <p:spPr>
+          <a:xfrm>
+            <a:off x="5451371" y="5227197"/>
+            <a:ext cx="1094787" cy="369332"/>
+          </a:xfrm>
+          <a:prstGeom prst="rect">
+            <a:avLst/>
+          </a:prstGeom>
+          <a:noFill/>
+        </p:spPr>
+        <p:txBody>
+          <a:bodyPr wrap="none" rtlCol="0">
+            <a:spAutoFit/>
+          </a:bodyPr>
+          <a:lstStyle/>
+          <a:p>
+            <a:r>
+              <a:rPr lang="en-US" dirty="0"/>
+              <a:t>Authorize</a:t>
+            </a:r>
+          </a:p>
+        </p:txBody>
+      </p:sp>
+      <p:sp>
+        <p:nvSpPr>
+          <p:cNvPr id="3" name="Title 2"/>
+          <p:cNvSpPr>
+            <a:spLocks noGrp="1"/>
+          </p:cNvSpPr>
+          <p:nvPr>
+            <p:ph type="title"/>
+          </p:nvPr>
+        </p:nvSpPr>
+        <p:spPr/>
+        <p:txBody>
+          <a:bodyPr/>
+          <a:lstStyle/>
+          <a:p>
+            <a:pPr algn="ctr"/>
+            <a:r>
+              <a:rPr lang="en-US" dirty="0"/>
+              <a:t>Implied Consent</a:t>
+            </a:r>
+          </a:p>
+        </p:txBody>
+      </p:sp>
+    </p:spTree>
+    <p:extLst>
+      <p:ext uri="{BB962C8B-B14F-4D97-AF65-F5344CB8AC3E}">
+        <p14:creationId xmlns:p14="http://schemas.microsoft.com/office/powerpoint/2010/main" val="1250645787"/>
+      </p:ext>
+    </p:extLst>
+  </p:cSld>
+  <p:clrMapOvr>
+    <a:masterClrMapping/>
+  </p:clrMapOvr>
+</p:sld>
+</file>
+
 <file path=ppt/theme/theme1.xml><?xml version="1.0" encoding="utf-8"?>
 <a:theme xmlns:a="http://schemas.openxmlformats.org/drawingml/2006/main" name="Office Theme">
   <a:themeElements>

</xml_diff>

<commit_message>
revisions from today face-to-face
</commit_message>
<xml_diff>
--- a/MHDS/Diagrams.pptx
+++ b/MHDS/Diagrams.pptx
@@ -13,6 +13,7 @@
     <p:sldId id="274" r:id="rId7"/>
     <p:sldId id="275" r:id="rId8"/>
     <p:sldId id="276" r:id="rId9"/>
+    <p:sldId id="335" r:id="rId10"/>
   </p:sldIdLst>
   <p:sldSz cx="12192000" cy="6858000"/>
   <p:notesSz cx="6858000" cy="9144000"/>
@@ -745,6 +746,711 @@
 </p:sldLayout>
 </file>
 
+<file path=ppt/slideLayouts/slideLayout12.xml><?xml version="1.0" encoding="utf-8"?>
+<p:sldLayout xmlns:a="http://schemas.openxmlformats.org/drawingml/2006/main" xmlns:r="http://schemas.openxmlformats.org/officeDocument/2006/relationships" xmlns:p="http://schemas.openxmlformats.org/presentationml/2006/main" userDrawn="1">
+  <p:cSld name="Title and Large Content">
+    <p:spTree>
+      <p:nvGrpSpPr>
+        <p:cNvPr id="1" name=""/>
+        <p:cNvGrpSpPr/>
+        <p:nvPr/>
+      </p:nvGrpSpPr>
+      <p:grpSpPr>
+        <a:xfrm>
+          <a:off x="0" y="0"/>
+          <a:ext cx="0" cy="0"/>
+          <a:chOff x="0" y="0"/>
+          <a:chExt cx="0" cy="0"/>
+        </a:xfrm>
+      </p:grpSpPr>
+      <p:sp>
+        <p:nvSpPr>
+          <p:cNvPr id="15" name="Slide Number Placeholder 5">
+            <a:extLst>
+              <a:ext uri="{FF2B5EF4-FFF2-40B4-BE49-F238E27FC236}">
+                <a16:creationId xmlns:a16="http://schemas.microsoft.com/office/drawing/2014/main" id="{070EEFE6-077D-DB49-B778-FA66FF929D72}"/>
+              </a:ext>
+            </a:extLst>
+          </p:cNvPr>
+          <p:cNvSpPr txBox="1">
+            <a:spLocks/>
+          </p:cNvSpPr>
+          <p:nvPr userDrawn="1"/>
+        </p:nvSpPr>
+        <p:spPr>
+          <a:xfrm>
+            <a:off x="-30480" y="171574"/>
+            <a:ext cx="447040" cy="365125"/>
+          </a:xfrm>
+          <a:prstGeom prst="rect">
+            <a:avLst/>
+          </a:prstGeom>
+        </p:spPr>
+        <p:txBody>
+          <a:bodyPr vert="horz" lIns="91440" tIns="45720" rIns="91440" bIns="45720" rtlCol="0" anchor="ctr"/>
+          <a:lstStyle>
+            <a:defPPr>
+              <a:defRPr lang="en-US"/>
+            </a:defPPr>
+            <a:lvl1pPr marL="0" algn="r" defTabSz="914400" rtl="0" eaLnBrk="1" latinLnBrk="0" hangingPunct="1">
+              <a:defRPr sz="1200" kern="1200">
+                <a:solidFill>
+                  <a:schemeClr val="bg1"/>
+                </a:solidFill>
+                <a:latin typeface="+mn-lt"/>
+                <a:ea typeface="+mn-ea"/>
+                <a:cs typeface="+mn-cs"/>
+              </a:defRPr>
+            </a:lvl1pPr>
+            <a:lvl2pPr marL="457200" algn="l" defTabSz="914400" rtl="0" eaLnBrk="1" latinLnBrk="0" hangingPunct="1">
+              <a:defRPr sz="1800" kern="1200">
+                <a:solidFill>
+                  <a:schemeClr val="tx1"/>
+                </a:solidFill>
+                <a:latin typeface="+mn-lt"/>
+                <a:ea typeface="+mn-ea"/>
+                <a:cs typeface="+mn-cs"/>
+              </a:defRPr>
+            </a:lvl2pPr>
+            <a:lvl3pPr marL="914400" algn="l" defTabSz="914400" rtl="0" eaLnBrk="1" latinLnBrk="0" hangingPunct="1">
+              <a:defRPr sz="1800" kern="1200">
+                <a:solidFill>
+                  <a:schemeClr val="tx1"/>
+                </a:solidFill>
+                <a:latin typeface="+mn-lt"/>
+                <a:ea typeface="+mn-ea"/>
+                <a:cs typeface="+mn-cs"/>
+              </a:defRPr>
+            </a:lvl3pPr>
+            <a:lvl4pPr marL="1371600" algn="l" defTabSz="914400" rtl="0" eaLnBrk="1" latinLnBrk="0" hangingPunct="1">
+              <a:defRPr sz="1800" kern="1200">
+                <a:solidFill>
+                  <a:schemeClr val="tx1"/>
+                </a:solidFill>
+                <a:latin typeface="+mn-lt"/>
+                <a:ea typeface="+mn-ea"/>
+                <a:cs typeface="+mn-cs"/>
+              </a:defRPr>
+            </a:lvl4pPr>
+            <a:lvl5pPr marL="1828800" algn="l" defTabSz="914400" rtl="0" eaLnBrk="1" latinLnBrk="0" hangingPunct="1">
+              <a:defRPr sz="1800" kern="1200">
+                <a:solidFill>
+                  <a:schemeClr val="tx1"/>
+                </a:solidFill>
+                <a:latin typeface="+mn-lt"/>
+                <a:ea typeface="+mn-ea"/>
+                <a:cs typeface="+mn-cs"/>
+              </a:defRPr>
+            </a:lvl5pPr>
+            <a:lvl6pPr marL="2286000" algn="l" defTabSz="914400" rtl="0" eaLnBrk="1" latinLnBrk="0" hangingPunct="1">
+              <a:defRPr sz="1800" kern="1200">
+                <a:solidFill>
+                  <a:schemeClr val="tx1"/>
+                </a:solidFill>
+                <a:latin typeface="+mn-lt"/>
+                <a:ea typeface="+mn-ea"/>
+                <a:cs typeface="+mn-cs"/>
+              </a:defRPr>
+            </a:lvl6pPr>
+            <a:lvl7pPr marL="2743200" algn="l" defTabSz="914400" rtl="0" eaLnBrk="1" latinLnBrk="0" hangingPunct="1">
+              <a:defRPr sz="1800" kern="1200">
+                <a:solidFill>
+                  <a:schemeClr val="tx1"/>
+                </a:solidFill>
+                <a:latin typeface="+mn-lt"/>
+                <a:ea typeface="+mn-ea"/>
+                <a:cs typeface="+mn-cs"/>
+              </a:defRPr>
+            </a:lvl7pPr>
+            <a:lvl8pPr marL="3200400" algn="l" defTabSz="914400" rtl="0" eaLnBrk="1" latinLnBrk="0" hangingPunct="1">
+              <a:defRPr sz="1800" kern="1200">
+                <a:solidFill>
+                  <a:schemeClr val="tx1"/>
+                </a:solidFill>
+                <a:latin typeface="+mn-lt"/>
+                <a:ea typeface="+mn-ea"/>
+                <a:cs typeface="+mn-cs"/>
+              </a:defRPr>
+            </a:lvl8pPr>
+            <a:lvl9pPr marL="3657600" algn="l" defTabSz="914400" rtl="0" eaLnBrk="1" latinLnBrk="0" hangingPunct="1">
+              <a:defRPr sz="1800" kern="1200">
+                <a:solidFill>
+                  <a:schemeClr val="tx1"/>
+                </a:solidFill>
+                <a:latin typeface="+mn-lt"/>
+                <a:ea typeface="+mn-ea"/>
+                <a:cs typeface="+mn-cs"/>
+              </a:defRPr>
+            </a:lvl9pPr>
+          </a:lstStyle>
+          <a:p>
+            <a:pPr algn="r"/>
+            <a:fld id="{B99C3163-F19B-2C48-9165-2CFC1523AB8D}" type="slidenum">
+              <a:rPr lang="en-US" sz="1100" b="1" smtClean="0">
+                <a:solidFill>
+                  <a:schemeClr val="bg1">
+                    <a:lumMod val="50000"/>
+                  </a:schemeClr>
+                </a:solidFill>
+                <a:latin typeface="Arial" panose="020B0604020202020204" pitchFamily="34" charset="0"/>
+                <a:cs typeface="Arial" panose="020B0604020202020204" pitchFamily="34" charset="0"/>
+              </a:rPr>
+              <a:pPr algn="r"/>
+              <a:t>‹#›</a:t>
+            </a:fld>
+            <a:endParaRPr lang="en-US" sz="1100" b="1" dirty="0">
+              <a:solidFill>
+                <a:schemeClr val="bg1">
+                  <a:lumMod val="50000"/>
+                </a:schemeClr>
+              </a:solidFill>
+              <a:latin typeface="Arial" panose="020B0604020202020204" pitchFamily="34" charset="0"/>
+              <a:cs typeface="Arial" panose="020B0604020202020204" pitchFamily="34" charset="0"/>
+            </a:endParaRPr>
+          </a:p>
+        </p:txBody>
+      </p:sp>
+      <p:sp>
+        <p:nvSpPr>
+          <p:cNvPr id="21" name="Date Placeholder 3">
+            <a:extLst>
+              <a:ext uri="{FF2B5EF4-FFF2-40B4-BE49-F238E27FC236}">
+                <a16:creationId xmlns:a16="http://schemas.microsoft.com/office/drawing/2014/main" id="{C93C3FC2-A4B2-9C46-A3E4-9593F8249C27}"/>
+              </a:ext>
+            </a:extLst>
+          </p:cNvPr>
+          <p:cNvSpPr>
+            <a:spLocks noGrp="1"/>
+          </p:cNvSpPr>
+          <p:nvPr>
+            <p:ph type="dt" sz="half" idx="10"/>
+          </p:nvPr>
+        </p:nvSpPr>
+        <p:spPr>
+          <a:xfrm>
+            <a:off x="15090" y="6518261"/>
+            <a:ext cx="1259840" cy="348027"/>
+          </a:xfrm>
+          <a:prstGeom prst="rect">
+            <a:avLst/>
+          </a:prstGeom>
+        </p:spPr>
+        <p:txBody>
+          <a:bodyPr/>
+          <a:lstStyle>
+            <a:lvl1pPr>
+              <a:defRPr sz="1100">
+                <a:solidFill>
+                  <a:schemeClr val="tx1">
+                    <a:lumMod val="50000"/>
+                    <a:lumOff val="50000"/>
+                  </a:schemeClr>
+                </a:solidFill>
+                <a:latin typeface="Arial" panose="020B0604020202020204" pitchFamily="34" charset="0"/>
+                <a:cs typeface="Arial" panose="020B0604020202020204" pitchFamily="34" charset="0"/>
+              </a:defRPr>
+            </a:lvl1pPr>
+          </a:lstStyle>
+          <a:p>
+            <a:fld id="{BFF328E6-E46B-6E40-8B27-5B2DDCCC311D}" type="datetime1">
+              <a:rPr lang="en-US" smtClean="0"/>
+              <a:t>2/18/2020</a:t>
+            </a:fld>
+            <a:endParaRPr lang="en-US" dirty="0"/>
+          </a:p>
+        </p:txBody>
+      </p:sp>
+      <p:sp>
+        <p:nvSpPr>
+          <p:cNvPr id="18" name="Content Placeholder 2">
+            <a:extLst>
+              <a:ext uri="{FF2B5EF4-FFF2-40B4-BE49-F238E27FC236}">
+                <a16:creationId xmlns:a16="http://schemas.microsoft.com/office/drawing/2014/main" id="{E45B2844-9C59-4F4A-A23F-C56225ED1138}"/>
+              </a:ext>
+            </a:extLst>
+          </p:cNvPr>
+          <p:cNvSpPr>
+            <a:spLocks noGrp="1"/>
+          </p:cNvSpPr>
+          <p:nvPr>
+            <p:ph idx="1"/>
+          </p:nvPr>
+        </p:nvSpPr>
+        <p:spPr>
+          <a:xfrm>
+            <a:off x="736778" y="1749287"/>
+            <a:ext cx="10601990" cy="4731027"/>
+          </a:xfrm>
+          <a:prstGeom prst="rect">
+            <a:avLst/>
+          </a:prstGeom>
+        </p:spPr>
+        <p:txBody>
+          <a:bodyPr>
+            <a:normAutofit/>
+          </a:bodyPr>
+          <a:lstStyle>
+            <a:lvl1pPr>
+              <a:lnSpc>
+                <a:spcPct val="100000"/>
+              </a:lnSpc>
+              <a:spcBef>
+                <a:spcPts val="2200"/>
+              </a:spcBef>
+              <a:spcAft>
+                <a:spcPts val="0"/>
+              </a:spcAft>
+              <a:defRPr sz="2000">
+                <a:solidFill>
+                  <a:schemeClr val="tx1"/>
+                </a:solidFill>
+                <a:latin typeface="Arial" panose="020B0604020202020204" pitchFamily="34" charset="0"/>
+                <a:cs typeface="Arial" panose="020B0604020202020204" pitchFamily="34" charset="0"/>
+              </a:defRPr>
+            </a:lvl1pPr>
+            <a:lvl2pPr>
+              <a:lnSpc>
+                <a:spcPct val="100000"/>
+              </a:lnSpc>
+              <a:spcBef>
+                <a:spcPts val="600"/>
+              </a:spcBef>
+              <a:spcAft>
+                <a:spcPts val="600"/>
+              </a:spcAft>
+              <a:defRPr sz="1800">
+                <a:solidFill>
+                  <a:schemeClr val="tx1"/>
+                </a:solidFill>
+                <a:latin typeface="Arial" panose="020B0604020202020204" pitchFamily="34" charset="0"/>
+                <a:cs typeface="Arial" panose="020B0604020202020204" pitchFamily="34" charset="0"/>
+              </a:defRPr>
+            </a:lvl2pPr>
+            <a:lvl3pPr>
+              <a:lnSpc>
+                <a:spcPct val="100000"/>
+              </a:lnSpc>
+              <a:spcBef>
+                <a:spcPts val="300"/>
+              </a:spcBef>
+              <a:spcAft>
+                <a:spcPts val="600"/>
+              </a:spcAft>
+              <a:defRPr sz="1800">
+                <a:solidFill>
+                  <a:schemeClr val="tx1"/>
+                </a:solidFill>
+                <a:latin typeface="Arial" panose="020B0604020202020204" pitchFamily="34" charset="0"/>
+                <a:cs typeface="Arial" panose="020B0604020202020204" pitchFamily="34" charset="0"/>
+              </a:defRPr>
+            </a:lvl3pPr>
+            <a:lvl4pPr>
+              <a:spcAft>
+                <a:spcPts val="1200"/>
+              </a:spcAft>
+              <a:defRPr sz="1800">
+                <a:solidFill>
+                  <a:schemeClr val="tx1"/>
+                </a:solidFill>
+                <a:latin typeface="Arial" panose="020B0604020202020204" pitchFamily="34" charset="0"/>
+                <a:cs typeface="Arial" panose="020B0604020202020204" pitchFamily="34" charset="0"/>
+              </a:defRPr>
+            </a:lvl4pPr>
+            <a:lvl5pPr>
+              <a:spcAft>
+                <a:spcPts val="1200"/>
+              </a:spcAft>
+              <a:defRPr sz="1800">
+                <a:solidFill>
+                  <a:schemeClr val="tx1"/>
+                </a:solidFill>
+                <a:latin typeface="Arial" panose="020B0604020202020204" pitchFamily="34" charset="0"/>
+                <a:cs typeface="Arial" panose="020B0604020202020204" pitchFamily="34" charset="0"/>
+              </a:defRPr>
+            </a:lvl5pPr>
+          </a:lstStyle>
+          <a:p>
+            <a:pPr lvl="0"/>
+            <a:r>
+              <a:rPr lang="en-US"/>
+              <a:t>Click to edit Master text styles</a:t>
+            </a:r>
+          </a:p>
+          <a:p>
+            <a:pPr lvl="1"/>
+            <a:r>
+              <a:rPr lang="en-US"/>
+              <a:t>Second level</a:t>
+            </a:r>
+          </a:p>
+          <a:p>
+            <a:pPr lvl="2"/>
+            <a:r>
+              <a:rPr lang="en-US"/>
+              <a:t>Third level</a:t>
+            </a:r>
+          </a:p>
+        </p:txBody>
+      </p:sp>
+      <p:sp>
+        <p:nvSpPr>
+          <p:cNvPr id="19" name="Title 1">
+            <a:extLst>
+              <a:ext uri="{FF2B5EF4-FFF2-40B4-BE49-F238E27FC236}">
+                <a16:creationId xmlns:a16="http://schemas.microsoft.com/office/drawing/2014/main" id="{C792172F-024B-A640-80DA-4146BE83054E}"/>
+              </a:ext>
+            </a:extLst>
+          </p:cNvPr>
+          <p:cNvSpPr>
+            <a:spLocks noGrp="1"/>
+          </p:cNvSpPr>
+          <p:nvPr>
+            <p:ph type="title" hasCustomPrompt="1"/>
+          </p:nvPr>
+        </p:nvSpPr>
+        <p:spPr>
+          <a:xfrm>
+            <a:off x="740993" y="595889"/>
+            <a:ext cx="8631607" cy="831811"/>
+          </a:xfrm>
+          <a:prstGeom prst="rect">
+            <a:avLst/>
+          </a:prstGeom>
+        </p:spPr>
+        <p:txBody>
+          <a:bodyPr anchor="t">
+            <a:noAutofit/>
+          </a:bodyPr>
+          <a:lstStyle>
+            <a:lvl1pPr>
+              <a:defRPr sz="2800">
+                <a:solidFill>
+                  <a:schemeClr val="tx2"/>
+                </a:solidFill>
+                <a:latin typeface="Arial" panose="020B0604020202020204" pitchFamily="34" charset="0"/>
+                <a:cs typeface="Arial" panose="020B0604020202020204" pitchFamily="34" charset="0"/>
+              </a:defRPr>
+            </a:lvl1pPr>
+          </a:lstStyle>
+          <a:p>
+            <a:r>
+              <a:rPr lang="en-US" dirty="0"/>
+              <a:t>Click to edit Master title text. Limit titles to 2 lines. Longer descriptions should be placed below</a:t>
+            </a:r>
+          </a:p>
+        </p:txBody>
+      </p:sp>
+      <p:sp>
+        <p:nvSpPr>
+          <p:cNvPr id="20" name="Footer Placeholder 4">
+            <a:extLst>
+              <a:ext uri="{FF2B5EF4-FFF2-40B4-BE49-F238E27FC236}">
+                <a16:creationId xmlns:a16="http://schemas.microsoft.com/office/drawing/2014/main" id="{1B57C602-E421-454F-B361-24B062289829}"/>
+              </a:ext>
+            </a:extLst>
+          </p:cNvPr>
+          <p:cNvSpPr>
+            <a:spLocks noGrp="1"/>
+          </p:cNvSpPr>
+          <p:nvPr>
+            <p:ph type="ftr" sz="quarter" idx="11"/>
+          </p:nvPr>
+        </p:nvSpPr>
+        <p:spPr>
+          <a:xfrm>
+            <a:off x="739317" y="221360"/>
+            <a:ext cx="8143831" cy="348027"/>
+          </a:xfrm>
+          <a:prstGeom prst="rect">
+            <a:avLst/>
+          </a:prstGeom>
+        </p:spPr>
+        <p:txBody>
+          <a:bodyPr/>
+          <a:lstStyle>
+            <a:lvl1pPr algn="l">
+              <a:defRPr sz="1100">
+                <a:solidFill>
+                  <a:schemeClr val="tx1">
+                    <a:lumMod val="50000"/>
+                    <a:lumOff val="50000"/>
+                  </a:schemeClr>
+                </a:solidFill>
+                <a:latin typeface="Arial" panose="020B0604020202020204" pitchFamily="34" charset="0"/>
+                <a:cs typeface="Arial" panose="020B0604020202020204" pitchFamily="34" charset="0"/>
+              </a:defRPr>
+            </a:lvl1pPr>
+          </a:lstStyle>
+          <a:p>
+            <a:r>
+              <a:rPr lang="en-US" dirty="0"/>
+              <a:t>Presentation Title</a:t>
+            </a:r>
+          </a:p>
+        </p:txBody>
+      </p:sp>
+      <p:sp>
+        <p:nvSpPr>
+          <p:cNvPr id="11" name="Rectangle 10">
+            <a:extLst>
+              <a:ext uri="{FF2B5EF4-FFF2-40B4-BE49-F238E27FC236}">
+                <a16:creationId xmlns:a16="http://schemas.microsoft.com/office/drawing/2014/main" id="{44575BDC-DCC0-0F4C-B05B-1A0947968926}"/>
+              </a:ext>
+              <a:ext uri="{C183D7F6-B498-43B3-948B-1728B52AA6E4}">
+                <adec:decorative xmlns:adec="http://schemas.microsoft.com/office/drawing/2017/decorative" val="1"/>
+              </a:ext>
+            </a:extLst>
+          </p:cNvPr>
+          <p:cNvSpPr/>
+          <p:nvPr userDrawn="1"/>
+        </p:nvSpPr>
+        <p:spPr>
+          <a:xfrm>
+            <a:off x="0" y="6756320"/>
+            <a:ext cx="12192000" cy="120725"/>
+          </a:xfrm>
+          <a:prstGeom prst="rect">
+            <a:avLst/>
+          </a:prstGeom>
+          <a:gradFill>
+            <a:gsLst>
+              <a:gs pos="50000">
+                <a:srgbClr val="498A95"/>
+              </a:gs>
+              <a:gs pos="0">
+                <a:schemeClr val="tx2"/>
+              </a:gs>
+              <a:gs pos="100000">
+                <a:schemeClr val="accent3"/>
+              </a:gs>
+            </a:gsLst>
+            <a:lin ang="0" scaled="0"/>
+          </a:gradFill>
+          <a:ln w="38100" cap="rnd">
+            <a:noFill/>
+          </a:ln>
+        </p:spPr>
+        <p:style>
+          <a:lnRef idx="2">
+            <a:schemeClr val="accent1">
+              <a:shade val="50000"/>
+            </a:schemeClr>
+          </a:lnRef>
+          <a:fillRef idx="1">
+            <a:schemeClr val="accent1"/>
+          </a:fillRef>
+          <a:effectRef idx="0">
+            <a:schemeClr val="accent1"/>
+          </a:effectRef>
+          <a:fontRef idx="minor">
+            <a:schemeClr val="lt1"/>
+          </a:fontRef>
+        </p:style>
+        <p:txBody>
+          <a:bodyPr rtlCol="0" anchor="ctr"/>
+          <a:lstStyle/>
+          <a:p>
+            <a:pPr algn="ctr"/>
+            <a:endParaRPr lang="en-US" dirty="0">
+              <a:solidFill>
+                <a:schemeClr val="tx1">
+                  <a:lumMod val="50000"/>
+                  <a:lumOff val="50000"/>
+                </a:schemeClr>
+              </a:solidFill>
+            </a:endParaRPr>
+          </a:p>
+        </p:txBody>
+      </p:sp>
+      <p:grpSp>
+        <p:nvGrpSpPr>
+          <p:cNvPr id="12" name="Group 11">
+            <a:extLst>
+              <a:ext uri="{FF2B5EF4-FFF2-40B4-BE49-F238E27FC236}">
+                <a16:creationId xmlns:a16="http://schemas.microsoft.com/office/drawing/2014/main" id="{8CB202EE-11BA-DB47-BC89-95F17B7C3E02}"/>
+              </a:ext>
+            </a:extLst>
+          </p:cNvPr>
+          <p:cNvGrpSpPr/>
+          <p:nvPr userDrawn="1"/>
+        </p:nvGrpSpPr>
+        <p:grpSpPr>
+          <a:xfrm>
+            <a:off x="9620161" y="96218"/>
+            <a:ext cx="2571839" cy="613973"/>
+            <a:chOff x="9620161" y="96218"/>
+            <a:chExt cx="2571839" cy="613973"/>
+          </a:xfrm>
+        </p:grpSpPr>
+        <p:grpSp>
+          <p:nvGrpSpPr>
+            <p:cNvPr id="13" name="Group 12">
+              <a:extLst>
+                <a:ext uri="{FF2B5EF4-FFF2-40B4-BE49-F238E27FC236}">
+                  <a16:creationId xmlns:a16="http://schemas.microsoft.com/office/drawing/2014/main" id="{076D5605-09A1-B441-85AE-B2A9A648999C}"/>
+                </a:ext>
+                <a:ext uri="{C183D7F6-B498-43B3-948B-1728B52AA6E4}">
+                  <adec:decorative xmlns:adec="http://schemas.microsoft.com/office/drawing/2017/decorative" val="1"/>
+                </a:ext>
+              </a:extLst>
+            </p:cNvPr>
+            <p:cNvGrpSpPr/>
+            <p:nvPr userDrawn="1"/>
+          </p:nvGrpSpPr>
+          <p:grpSpPr>
+            <a:xfrm>
+              <a:off x="9620161" y="96218"/>
+              <a:ext cx="2571839" cy="613973"/>
+              <a:chOff x="9620161" y="96218"/>
+              <a:chExt cx="2571839" cy="613973"/>
+            </a:xfrm>
+          </p:grpSpPr>
+          <p:cxnSp>
+            <p:nvCxnSpPr>
+              <p:cNvPr id="16" name="Straight Arrow Connector 15">
+                <a:extLst>
+                  <a:ext uri="{FF2B5EF4-FFF2-40B4-BE49-F238E27FC236}">
+                    <a16:creationId xmlns:a16="http://schemas.microsoft.com/office/drawing/2014/main" id="{84CFD749-9A51-B540-8385-13D6D909A0A7}"/>
+                  </a:ext>
+                </a:extLst>
+              </p:cNvPr>
+              <p:cNvCxnSpPr>
+                <a:cxnSpLocks/>
+              </p:cNvCxnSpPr>
+              <p:nvPr userDrawn="1"/>
+            </p:nvCxnSpPr>
+            <p:spPr>
+              <a:xfrm>
+                <a:off x="9620161" y="710191"/>
+                <a:ext cx="2571839" cy="0"/>
+              </a:xfrm>
+              <a:prstGeom prst="straightConnector1">
+                <a:avLst/>
+              </a:prstGeom>
+              <a:ln w="34925" cap="rnd">
+                <a:solidFill>
+                  <a:schemeClr val="accent3"/>
+                </a:solidFill>
+                <a:tailEnd type="none"/>
+              </a:ln>
+            </p:spPr>
+            <p:style>
+              <a:lnRef idx="1">
+                <a:schemeClr val="accent1"/>
+              </a:lnRef>
+              <a:fillRef idx="0">
+                <a:schemeClr val="accent1"/>
+              </a:fillRef>
+              <a:effectRef idx="0">
+                <a:schemeClr val="accent1"/>
+              </a:effectRef>
+              <a:fontRef idx="minor">
+                <a:schemeClr val="tx1"/>
+              </a:fontRef>
+            </p:style>
+          </p:cxnSp>
+          <p:pic>
+            <p:nvPicPr>
+              <p:cNvPr id="17" name="Graphic 16" descr="U.S. Department of Health and Human Services">
+                <a:extLst>
+                  <a:ext uri="{FF2B5EF4-FFF2-40B4-BE49-F238E27FC236}">
+                    <a16:creationId xmlns:a16="http://schemas.microsoft.com/office/drawing/2014/main" id="{F19E28AF-23F3-214C-B2B6-1F3AD588A630}"/>
+                  </a:ext>
+                </a:extLst>
+              </p:cNvPr>
+              <p:cNvPicPr>
+                <a:picLocks noChangeAspect="1"/>
+              </p:cNvPicPr>
+              <p:nvPr userDrawn="1"/>
+            </p:nvPicPr>
+            <p:blipFill>
+              <a:blip r:embed="rId2">
+                <a:extLst>
+                  <a:ext uri="{96DAC541-7B7A-43D3-8B79-37D633B846F1}">
+                    <asvg:svgBlip xmlns:asvg="http://schemas.microsoft.com/office/drawing/2016/SVG/main" r:embed="rId3"/>
+                  </a:ext>
+                </a:extLst>
+              </a:blip>
+              <a:stretch>
+                <a:fillRect/>
+              </a:stretch>
+            </p:blipFill>
+            <p:spPr>
+              <a:xfrm>
+                <a:off x="11501949" y="96218"/>
+                <a:ext cx="505811" cy="505811"/>
+              </a:xfrm>
+              <a:prstGeom prst="rect">
+                <a:avLst/>
+              </a:prstGeom>
+            </p:spPr>
+          </p:pic>
+        </p:grpSp>
+        <p:pic>
+          <p:nvPicPr>
+            <p:cNvPr id="14" name="Graphic 13">
+              <a:extLst>
+                <a:ext uri="{FF2B5EF4-FFF2-40B4-BE49-F238E27FC236}">
+                  <a16:creationId xmlns:a16="http://schemas.microsoft.com/office/drawing/2014/main" id="{6E62FE9A-FA76-1541-A6DD-26CF30C68A2D}"/>
+                </a:ext>
+                <a:ext uri="{C183D7F6-B498-43B3-948B-1728B52AA6E4}">
+                  <adec:decorative xmlns:adec="http://schemas.microsoft.com/office/drawing/2017/decorative" val="1"/>
+                </a:ext>
+              </a:extLst>
+            </p:cNvPr>
+            <p:cNvPicPr>
+              <a:picLocks noChangeAspect="1"/>
+            </p:cNvPicPr>
+            <p:nvPr userDrawn="1"/>
+          </p:nvPicPr>
+          <p:blipFill>
+            <a:blip r:embed="rId4">
+              <a:extLst>
+                <a:ext uri="{96DAC541-7B7A-43D3-8B79-37D633B846F1}">
+                  <asvg:svgBlip xmlns:asvg="http://schemas.microsoft.com/office/drawing/2016/SVG/main" r:embed="rId5"/>
+                </a:ext>
+              </a:extLst>
+            </a:blip>
+            <a:stretch>
+              <a:fillRect/>
+            </a:stretch>
+          </p:blipFill>
+          <p:spPr>
+            <a:xfrm>
+              <a:off x="9702892" y="139107"/>
+              <a:ext cx="1572125" cy="414276"/>
+            </a:xfrm>
+            <a:prstGeom prst="rect">
+              <a:avLst/>
+            </a:prstGeom>
+          </p:spPr>
+        </p:pic>
+      </p:grpSp>
+    </p:spTree>
+    <p:extLst>
+      <p:ext uri="{BB962C8B-B14F-4D97-AF65-F5344CB8AC3E}">
+        <p14:creationId xmlns:p14="http://schemas.microsoft.com/office/powerpoint/2010/main" val="1394468050"/>
+      </p:ext>
+    </p:extLst>
+  </p:cSld>
+  <p:clrMapOvr>
+    <a:masterClrMapping/>
+  </p:clrMapOvr>
+  <mc:AlternateContent xmlns:mc="http://schemas.openxmlformats.org/markup-compatibility/2006" xmlns:p14="http://schemas.microsoft.com/office/powerpoint/2010/main">
+    <mc:Choice Requires="p14">
+      <p:transition spd="med" p14:dur="700">
+        <p:fade/>
+      </p:transition>
+    </mc:Choice>
+    <mc:Fallback xmlns="">
+      <p:transition spd="med">
+        <p:fade/>
+      </p:transition>
+    </mc:Fallback>
+  </mc:AlternateContent>
+</p:sldLayout>
+</file>
+
 <file path=ppt/slideLayouts/slideLayout2.xml><?xml version="1.0" encoding="utf-8"?>
 <p:sldLayout xmlns:a="http://schemas.openxmlformats.org/drawingml/2006/main" xmlns:r="http://schemas.openxmlformats.org/officeDocument/2006/relationships" xmlns:p="http://schemas.openxmlformats.org/presentationml/2006/main" type="obj" preserve="1">
   <p:cSld name="Title and Content">
@@ -3032,6 +3738,7 @@
     <p:sldLayoutId id="2147483657" r:id="rId9"/>
     <p:sldLayoutId id="2147483658" r:id="rId10"/>
     <p:sldLayoutId id="2147483659" r:id="rId11"/>
+    <p:sldLayoutId id="2147483660" r:id="rId12"/>
   </p:sldLayoutIdLst>
   <p:txStyles>
     <p:titleStyle>
@@ -4252,8 +4959,8 @@
         </p:nvSpPr>
         <p:spPr>
           <a:xfrm>
-            <a:off x="5967313" y="1461051"/>
-            <a:ext cx="3534495" cy="369332"/>
+            <a:off x="1203960" y="701040"/>
+            <a:ext cx="9616439" cy="523220"/>
           </a:xfrm>
           <a:prstGeom prst="rect">
             <a:avLst/>
@@ -4271,8 +4978,9 @@
           </a:bodyPr>
           <a:lstStyle/>
           <a:p>
-            <a:r>
-              <a:rPr lang="en-US" dirty="0"/>
+            <a:pPr algn="ctr"/>
+            <a:r>
+              <a:rPr lang="en-US" sz="2800" dirty="0"/>
               <a:t>Document Registry</a:t>
             </a:r>
           </a:p>
@@ -4292,8 +5000,8 @@
         </p:nvSpPr>
         <p:spPr>
           <a:xfrm rot="16200000">
-            <a:off x="5056261" y="3120035"/>
-            <a:ext cx="2952025" cy="369332"/>
+            <a:off x="83257" y="3292944"/>
+            <a:ext cx="5109188" cy="954107"/>
           </a:xfrm>
           <a:prstGeom prst="rect">
             <a:avLst/>
@@ -4313,10 +5021,13 @@
           <a:lstStyle/>
           <a:p>
             <a:r>
-              <a:rPr lang="en-US" dirty="0"/>
+              <a:rPr lang="en-US" sz="2800" dirty="0"/>
               <a:t>MHD – Document Recipient</a:t>
             </a:r>
           </a:p>
+          <a:p>
+            <a:endParaRPr lang="en-US" sz="2800" dirty="0"/>
+          </a:p>
         </p:txBody>
       </p:sp>
       <p:sp>
@@ -4333,8 +5044,8 @@
         </p:nvSpPr>
         <p:spPr>
           <a:xfrm rot="16200000">
-            <a:off x="4685907" y="3120034"/>
-            <a:ext cx="2952025" cy="369332"/>
+            <a:off x="-848251" y="3292942"/>
+            <a:ext cx="5109188" cy="954107"/>
           </a:xfrm>
           <a:prstGeom prst="rect">
             <a:avLst/>
@@ -4354,10 +5065,13 @@
           <a:lstStyle/>
           <a:p>
             <a:r>
-              <a:rPr lang="en-US" dirty="0"/>
+              <a:rPr lang="en-US" sz="2800" dirty="0"/>
               <a:t>MHD - Document Responder</a:t>
             </a:r>
           </a:p>
+          <a:p>
+            <a:endParaRPr lang="en-US" sz="2800" dirty="0"/>
+          </a:p>
         </p:txBody>
       </p:sp>
       <p:sp>
@@ -4374,8 +5088,8 @@
         </p:nvSpPr>
         <p:spPr>
           <a:xfrm rot="16200000">
-            <a:off x="5568248" y="2981538"/>
-            <a:ext cx="2952026" cy="646331"/>
+            <a:off x="1046470" y="3292949"/>
+            <a:ext cx="5109189" cy="954107"/>
           </a:xfrm>
           <a:prstGeom prst="rect">
             <a:avLst/>
@@ -4395,10 +5109,13 @@
           <a:lstStyle/>
           <a:p>
             <a:r>
-              <a:rPr lang="en-US" dirty="0"/>
+              <a:rPr lang="en-US" sz="2800" dirty="0"/>
               <a:t>PMIR – Patient Identity Consumer</a:t>
             </a:r>
           </a:p>
+          <a:p>
+            <a:endParaRPr lang="en-US" sz="2800" dirty="0"/>
+          </a:p>
         </p:txBody>
       </p:sp>
       <p:sp>
@@ -4415,8 +5132,8 @@
         </p:nvSpPr>
         <p:spPr>
           <a:xfrm rot="16200000">
-            <a:off x="7370427" y="3120032"/>
-            <a:ext cx="2952025" cy="369332"/>
+            <a:off x="5491161" y="3292941"/>
+            <a:ext cx="5109188" cy="954106"/>
           </a:xfrm>
           <a:prstGeom prst="rect">
             <a:avLst/>
@@ -4436,8 +5153,8 @@
           <a:lstStyle/>
           <a:p>
             <a:r>
-              <a:rPr lang="en-US" dirty="0"/>
-              <a:t>mCSD – Consumer</a:t>
+              <a:rPr lang="en-US" sz="2800" dirty="0"/>
+              <a:t>mCSD – Care Services Selective Consumer</a:t>
             </a:r>
           </a:p>
         </p:txBody>
@@ -4456,8 +5173,8 @@
         </p:nvSpPr>
         <p:spPr>
           <a:xfrm rot="16200000">
-            <a:off x="6921583" y="3120029"/>
-            <a:ext cx="2952025" cy="369332"/>
+            <a:off x="4161938" y="3292935"/>
+            <a:ext cx="5109188" cy="954107"/>
           </a:xfrm>
           <a:prstGeom prst="rect">
             <a:avLst/>
@@ -4477,10 +5194,13 @@
           <a:lstStyle/>
           <a:p>
             <a:r>
-              <a:rPr lang="en-US" dirty="0"/>
+              <a:rPr lang="en-US" sz="2800" dirty="0"/>
               <a:t>SVCM – Consumer</a:t>
             </a:r>
           </a:p>
+          <a:p>
+            <a:endParaRPr lang="en-US" sz="2800" dirty="0"/>
+          </a:p>
         </p:txBody>
       </p:sp>
       <p:sp>
@@ -4497,8 +5217,8 @@
         </p:nvSpPr>
         <p:spPr>
           <a:xfrm rot="16200000">
-            <a:off x="7799395" y="3120028"/>
-            <a:ext cx="2952025" cy="369332"/>
+            <a:off x="6809869" y="3292932"/>
+            <a:ext cx="5109188" cy="954107"/>
           </a:xfrm>
           <a:prstGeom prst="rect">
             <a:avLst/>
@@ -4518,9 +5238,12 @@
           <a:lstStyle/>
           <a:p>
             <a:r>
-              <a:rPr lang="en-US" dirty="0"/>
-              <a:t>IUA – Consumer</a:t>
-            </a:r>
+              <a:rPr lang="en-US" sz="2800" dirty="0"/>
+              <a:t>IUA – Resource Server</a:t>
+            </a:r>
+          </a:p>
+          <a:p>
+            <a:endParaRPr lang="en-US" sz="2800" dirty="0"/>
           </a:p>
         </p:txBody>
       </p:sp>
@@ -4538,8 +5261,8 @@
         </p:nvSpPr>
         <p:spPr>
           <a:xfrm rot="16200000">
-            <a:off x="6081184" y="3120034"/>
-            <a:ext cx="2952025" cy="369332"/>
+            <a:off x="2027074" y="3292942"/>
+            <a:ext cx="5109188" cy="954107"/>
           </a:xfrm>
           <a:prstGeom prst="rect">
             <a:avLst/>
@@ -4559,10 +5282,13 @@
           <a:lstStyle/>
           <a:p>
             <a:r>
-              <a:rPr lang="en-US" dirty="0"/>
+              <a:rPr lang="en-US" sz="2800" dirty="0"/>
               <a:t>ATNA – Secure Node</a:t>
             </a:r>
           </a:p>
+          <a:p>
+            <a:endParaRPr lang="en-US" sz="2800" dirty="0"/>
+          </a:p>
         </p:txBody>
       </p:sp>
       <p:sp>
@@ -4579,8 +5305,8 @@
         </p:nvSpPr>
         <p:spPr>
           <a:xfrm rot="16200000">
-            <a:off x="6450588" y="3120032"/>
-            <a:ext cx="2952025" cy="369332"/>
+            <a:off x="3002147" y="3292940"/>
+            <a:ext cx="5109188" cy="954107"/>
           </a:xfrm>
           <a:prstGeom prst="rect">
             <a:avLst/>
@@ -4600,9 +5326,56 @@
           <a:lstStyle/>
           <a:p>
             <a:r>
-              <a:rPr lang="en-US" dirty="0"/>
+              <a:rPr lang="en-US" sz="2800" dirty="0"/>
               <a:t>CT – Time Client</a:t>
             </a:r>
+          </a:p>
+          <a:p>
+            <a:endParaRPr lang="en-US" sz="2800" dirty="0"/>
+          </a:p>
+        </p:txBody>
+      </p:sp>
+      <p:sp>
+        <p:nvSpPr>
+          <p:cNvPr id="15" name="TextBox 14">
+            <a:extLst>
+              <a:ext uri="{FF2B5EF4-FFF2-40B4-BE49-F238E27FC236}">
+                <a16:creationId xmlns:a16="http://schemas.microsoft.com/office/drawing/2014/main" id="{05F167F6-00BE-4E1C-89A8-E6B33FDF3154}"/>
+              </a:ext>
+            </a:extLst>
+          </p:cNvPr>
+          <p:cNvSpPr txBox="1"/>
+          <p:nvPr/>
+        </p:nvSpPr>
+        <p:spPr>
+          <a:xfrm rot="16200000">
+            <a:off x="7785969" y="3292932"/>
+            <a:ext cx="5109188" cy="954107"/>
+          </a:xfrm>
+          <a:prstGeom prst="rect">
+            <a:avLst/>
+          </a:prstGeom>
+          <a:noFill/>
+          <a:ln>
+            <a:solidFill>
+              <a:schemeClr val="tx1"/>
+            </a:solidFill>
+            <a:prstDash val="dash"/>
+          </a:ln>
+        </p:spPr>
+        <p:txBody>
+          <a:bodyPr wrap="square" rtlCol="0">
+            <a:spAutoFit/>
+          </a:bodyPr>
+          <a:lstStyle/>
+          <a:p>
+            <a:r>
+              <a:rPr lang="en-US" sz="2800" dirty="0"/>
+              <a:t>IUA – Authorization Service</a:t>
+            </a:r>
+          </a:p>
+          <a:p>
+            <a:endParaRPr lang="en-US" sz="2800" dirty="0"/>
           </a:p>
         </p:txBody>
       </p:sp>
@@ -11032,6 +11805,1396 @@
   <p:clrMapOvr>
     <a:masterClrMapping/>
   </p:clrMapOvr>
+</p:sld>
+</file>
+
+<file path=ppt/slides/slide9.xml><?xml version="1.0" encoding="utf-8"?>
+<p:sld xmlns:a="http://schemas.openxmlformats.org/drawingml/2006/main" xmlns:r="http://schemas.openxmlformats.org/officeDocument/2006/relationships" xmlns:p="http://schemas.openxmlformats.org/presentationml/2006/main">
+  <p:cSld>
+    <p:spTree>
+      <p:nvGrpSpPr>
+        <p:cNvPr id="1" name=""/>
+        <p:cNvGrpSpPr/>
+        <p:nvPr/>
+      </p:nvGrpSpPr>
+      <p:grpSpPr>
+        <a:xfrm>
+          <a:off x="0" y="0"/>
+          <a:ext cx="0" cy="0"/>
+          <a:chOff x="0" y="0"/>
+          <a:chExt cx="0" cy="0"/>
+        </a:xfrm>
+      </p:grpSpPr>
+      <p:sp>
+        <p:nvSpPr>
+          <p:cNvPr id="33" name="Oval 32"/>
+          <p:cNvSpPr/>
+          <p:nvPr/>
+        </p:nvSpPr>
+        <p:spPr>
+          <a:xfrm>
+            <a:off x="9412667" y="3726558"/>
+            <a:ext cx="1134996" cy="1096117"/>
+          </a:xfrm>
+          <a:prstGeom prst="ellipse">
+            <a:avLst/>
+          </a:prstGeom>
+          <a:gradFill rotWithShape="1">
+            <a:gsLst>
+              <a:gs pos="0">
+                <a:srgbClr val="A5A5A5">
+                  <a:satMod val="103000"/>
+                  <a:lumMod val="102000"/>
+                  <a:tint val="94000"/>
+                </a:srgbClr>
+              </a:gs>
+              <a:gs pos="50000">
+                <a:srgbClr val="A5A5A5">
+                  <a:satMod val="110000"/>
+                  <a:lumMod val="100000"/>
+                  <a:shade val="100000"/>
+                </a:srgbClr>
+              </a:gs>
+              <a:gs pos="100000">
+                <a:srgbClr val="A5A5A5">
+                  <a:lumMod val="99000"/>
+                  <a:satMod val="120000"/>
+                  <a:shade val="78000"/>
+                </a:srgbClr>
+              </a:gs>
+            </a:gsLst>
+            <a:lin ang="5400000" scaled="0"/>
+          </a:gradFill>
+          <a:ln>
+            <a:noFill/>
+          </a:ln>
+          <a:effectLst>
+            <a:outerShdw blurRad="57150" dist="19050" dir="5400000" algn="ctr" rotWithShape="0">
+              <a:srgbClr val="000000">
+                <a:alpha val="63000"/>
+              </a:srgbClr>
+            </a:outerShdw>
+          </a:effectLst>
+        </p:spPr>
+        <p:txBody>
+          <a:bodyPr rtlCol="0" anchor="ctr"/>
+          <a:lstStyle/>
+          <a:p>
+            <a:pPr marL="0" marR="0" lvl="0" indent="0" algn="ctr" defTabSz="914400" eaLnBrk="1" fontAlgn="auto" latinLnBrk="0" hangingPunct="1">
+              <a:lnSpc>
+                <a:spcPct val="100000"/>
+              </a:lnSpc>
+              <a:spcBef>
+                <a:spcPts val="0"/>
+              </a:spcBef>
+              <a:spcAft>
+                <a:spcPts val="0"/>
+              </a:spcAft>
+              <a:buClrTx/>
+              <a:buSzTx/>
+              <a:buFontTx/>
+              <a:buNone/>
+              <a:tabLst/>
+              <a:defRPr/>
+            </a:pPr>
+            <a:endParaRPr kumimoji="0" lang="en-US" sz="1800" b="0" i="0" u="none" strike="noStrike" kern="0" cap="none" spc="0" normalizeH="0" baseline="0" noProof="0">
+              <a:ln>
+                <a:noFill/>
+              </a:ln>
+              <a:solidFill>
+                <a:prstClr val="white"/>
+              </a:solidFill>
+              <a:effectLst/>
+              <a:uLnTx/>
+              <a:uFillTx/>
+              <a:latin typeface="Calibri" panose="020F0502020204030204"/>
+              <a:ea typeface="+mn-ea"/>
+              <a:cs typeface="+mn-cs"/>
+            </a:endParaRPr>
+          </a:p>
+        </p:txBody>
+      </p:sp>
+      <p:pic>
+        <p:nvPicPr>
+          <p:cNvPr id="35" name="Graphic 14">
+            <a:extLst>
+              <a:ext uri="{FF2B5EF4-FFF2-40B4-BE49-F238E27FC236}">
+                <a16:creationId xmlns:a16="http://schemas.microsoft.com/office/drawing/2014/main" id="{4C842014-4FE7-8248-B227-C58E30B4C7DD}"/>
+              </a:ext>
+            </a:extLst>
+          </p:cNvPr>
+          <p:cNvPicPr>
+            <a:picLocks noChangeAspect="1"/>
+          </p:cNvPicPr>
+          <p:nvPr/>
+        </p:nvPicPr>
+        <p:blipFill>
+          <a:blip r:embed="rId2" cstate="print">
+            <a:extLst>
+              <a:ext uri="{28A0092B-C50C-407E-A947-70E740481C1C}">
+                <a14:useLocalDpi xmlns:a14="http://schemas.microsoft.com/office/drawing/2010/main" val="0"/>
+              </a:ext>
+              <a:ext uri="{96DAC541-7B7A-43D3-8B79-37D633B846F1}">
+                <asvg:svgBlip xmlns:asvg="http://schemas.microsoft.com/office/drawing/2016/SVG/main" r:embed="rId3"/>
+              </a:ext>
+            </a:extLst>
+          </a:blip>
+          <a:stretch>
+            <a:fillRect/>
+          </a:stretch>
+        </p:blipFill>
+        <p:spPr>
+          <a:xfrm>
+            <a:off x="9596290" y="4037888"/>
+            <a:ext cx="492594" cy="435315"/>
+          </a:xfrm>
+          <a:prstGeom prst="rect">
+            <a:avLst/>
+          </a:prstGeom>
+        </p:spPr>
+      </p:pic>
+      <p:sp>
+        <p:nvSpPr>
+          <p:cNvPr id="36" name="Oval 35"/>
+          <p:cNvSpPr/>
+          <p:nvPr/>
+        </p:nvSpPr>
+        <p:spPr>
+          <a:xfrm>
+            <a:off x="1581029" y="3777285"/>
+            <a:ext cx="1134996" cy="1096117"/>
+          </a:xfrm>
+          <a:prstGeom prst="ellipse">
+            <a:avLst/>
+          </a:prstGeom>
+          <a:gradFill rotWithShape="1">
+            <a:gsLst>
+              <a:gs pos="0">
+                <a:srgbClr val="4472C4">
+                  <a:satMod val="103000"/>
+                  <a:lumMod val="102000"/>
+                  <a:tint val="94000"/>
+                </a:srgbClr>
+              </a:gs>
+              <a:gs pos="50000">
+                <a:srgbClr val="4472C4">
+                  <a:satMod val="110000"/>
+                  <a:lumMod val="100000"/>
+                  <a:shade val="100000"/>
+                </a:srgbClr>
+              </a:gs>
+              <a:gs pos="100000">
+                <a:srgbClr val="4472C4">
+                  <a:lumMod val="99000"/>
+                  <a:satMod val="120000"/>
+                  <a:shade val="78000"/>
+                </a:srgbClr>
+              </a:gs>
+            </a:gsLst>
+            <a:lin ang="5400000" scaled="0"/>
+          </a:gradFill>
+          <a:ln>
+            <a:noFill/>
+          </a:ln>
+          <a:effectLst>
+            <a:outerShdw blurRad="57150" dist="19050" dir="5400000" algn="ctr" rotWithShape="0">
+              <a:srgbClr val="000000">
+                <a:alpha val="63000"/>
+              </a:srgbClr>
+            </a:outerShdw>
+          </a:effectLst>
+        </p:spPr>
+        <p:txBody>
+          <a:bodyPr rtlCol="0" anchor="ctr"/>
+          <a:lstStyle/>
+          <a:p>
+            <a:pPr marL="0" marR="0" lvl="0" indent="0" algn="ctr" defTabSz="914400" eaLnBrk="1" fontAlgn="auto" latinLnBrk="0" hangingPunct="1">
+              <a:lnSpc>
+                <a:spcPct val="100000"/>
+              </a:lnSpc>
+              <a:spcBef>
+                <a:spcPts val="0"/>
+              </a:spcBef>
+              <a:spcAft>
+                <a:spcPts val="0"/>
+              </a:spcAft>
+              <a:buClrTx/>
+              <a:buSzTx/>
+              <a:buFontTx/>
+              <a:buNone/>
+              <a:tabLst/>
+              <a:defRPr/>
+            </a:pPr>
+            <a:endParaRPr kumimoji="0" lang="en-US" sz="1800" b="0" i="0" u="none" strike="noStrike" kern="0" cap="none" spc="0" normalizeH="0" baseline="0" noProof="0">
+              <a:ln>
+                <a:noFill/>
+              </a:ln>
+              <a:solidFill>
+                <a:prstClr val="white"/>
+              </a:solidFill>
+              <a:effectLst/>
+              <a:uLnTx/>
+              <a:uFillTx/>
+              <a:latin typeface="Calibri" panose="020F0502020204030204"/>
+              <a:ea typeface="+mn-ea"/>
+              <a:cs typeface="+mn-cs"/>
+            </a:endParaRPr>
+          </a:p>
+        </p:txBody>
+      </p:sp>
+      <p:pic>
+        <p:nvPicPr>
+          <p:cNvPr id="38" name="Graphic 121">
+            <a:extLst>
+              <a:ext uri="{FF2B5EF4-FFF2-40B4-BE49-F238E27FC236}">
+                <a16:creationId xmlns:a16="http://schemas.microsoft.com/office/drawing/2014/main" id="{2C9FF427-13D1-C84E-8C68-BE7B9C03809B}"/>
+              </a:ext>
+            </a:extLst>
+          </p:cNvPr>
+          <p:cNvPicPr>
+            <a:picLocks noChangeAspect="1"/>
+          </p:cNvPicPr>
+          <p:nvPr/>
+        </p:nvPicPr>
+        <p:blipFill>
+          <a:blip r:embed="rId4" cstate="print">
+            <a:extLst>
+              <a:ext uri="{28A0092B-C50C-407E-A947-70E740481C1C}">
+                <a14:useLocalDpi xmlns:a14="http://schemas.microsoft.com/office/drawing/2010/main" val="0"/>
+              </a:ext>
+              <a:ext uri="{96DAC541-7B7A-43D3-8B79-37D633B846F1}">
+                <asvg:svgBlip xmlns:asvg="http://schemas.microsoft.com/office/drawing/2016/SVG/main" r:embed="rId5"/>
+              </a:ext>
+            </a:extLst>
+          </a:blip>
+          <a:stretch>
+            <a:fillRect/>
+          </a:stretch>
+        </p:blipFill>
+        <p:spPr>
+          <a:xfrm>
+            <a:off x="1901579" y="4069359"/>
+            <a:ext cx="493895" cy="493895"/>
+          </a:xfrm>
+          <a:prstGeom prst="rect">
+            <a:avLst/>
+          </a:prstGeom>
+          <a:solidFill>
+            <a:srgbClr val="4775CA"/>
+          </a:solidFill>
+          <a:ln w="12700" cap="flat" cmpd="sng" algn="ctr">
+            <a:solidFill>
+              <a:srgbClr val="ED7D31">
+                <a:shade val="50000"/>
+              </a:srgbClr>
+            </a:solidFill>
+            <a:prstDash val="solid"/>
+            <a:miter lim="800000"/>
+          </a:ln>
+          <a:effectLst/>
+        </p:spPr>
+      </p:pic>
+      <p:sp>
+        <p:nvSpPr>
+          <p:cNvPr id="42" name="TextBox 41"/>
+          <p:cNvSpPr txBox="1"/>
+          <p:nvPr/>
+        </p:nvSpPr>
+        <p:spPr>
+          <a:xfrm>
+            <a:off x="143462" y="2692708"/>
+            <a:ext cx="3368102" cy="954107"/>
+          </a:xfrm>
+          <a:prstGeom prst="rect">
+            <a:avLst/>
+          </a:prstGeom>
+          <a:noFill/>
+        </p:spPr>
+        <p:txBody>
+          <a:bodyPr wrap="none" rtlCol="0">
+            <a:spAutoFit/>
+          </a:bodyPr>
+          <a:lstStyle/>
+          <a:p>
+            <a:pPr defTabSz="914400"/>
+            <a:r>
+              <a:rPr lang="en-US" sz="2800" b="1" dirty="0">
+                <a:solidFill>
+                  <a:prstClr val="white">
+                    <a:lumMod val="50000"/>
+                  </a:prstClr>
+                </a:solidFill>
+                <a:latin typeface="Calibri" panose="020F0502020204030204"/>
+              </a:rPr>
+              <a:t>System that</a:t>
+            </a:r>
+          </a:p>
+          <a:p>
+            <a:pPr defTabSz="914400"/>
+            <a:r>
+              <a:rPr lang="en-US" sz="2800" b="1" dirty="0">
+                <a:solidFill>
+                  <a:prstClr val="white">
+                    <a:lumMod val="50000"/>
+                  </a:prstClr>
+                </a:solidFill>
+                <a:latin typeface="Calibri" panose="020F0502020204030204"/>
+              </a:rPr>
+              <a:t>Publishes Documents</a:t>
+            </a:r>
+          </a:p>
+        </p:txBody>
+      </p:sp>
+      <p:sp>
+        <p:nvSpPr>
+          <p:cNvPr id="44" name="TextBox 43"/>
+          <p:cNvSpPr txBox="1"/>
+          <p:nvPr/>
+        </p:nvSpPr>
+        <p:spPr>
+          <a:xfrm>
+            <a:off x="8671560" y="2610005"/>
+            <a:ext cx="3519078" cy="954107"/>
+          </a:xfrm>
+          <a:prstGeom prst="rect">
+            <a:avLst/>
+          </a:prstGeom>
+          <a:noFill/>
+        </p:spPr>
+        <p:txBody>
+          <a:bodyPr wrap="square" rtlCol="0">
+            <a:spAutoFit/>
+          </a:bodyPr>
+          <a:lstStyle/>
+          <a:p>
+            <a:pPr algn="r" defTabSz="914400"/>
+            <a:r>
+              <a:rPr lang="en-US" sz="2800" b="1" dirty="0">
+                <a:solidFill>
+                  <a:prstClr val="white">
+                    <a:lumMod val="50000"/>
+                  </a:prstClr>
+                </a:solidFill>
+                <a:latin typeface="Calibri" panose="020F0502020204030204"/>
+              </a:rPr>
+              <a:t>System that </a:t>
+            </a:r>
+          </a:p>
+          <a:p>
+            <a:pPr defTabSz="914400"/>
+            <a:r>
+              <a:rPr lang="en-US" sz="2800" b="1" dirty="0">
+                <a:solidFill>
+                  <a:prstClr val="white">
+                    <a:lumMod val="50000"/>
+                  </a:prstClr>
+                </a:solidFill>
+                <a:latin typeface="Calibri" panose="020F0502020204030204"/>
+              </a:rPr>
+              <a:t>Consumes Documents</a:t>
+            </a:r>
+            <a:endParaRPr lang="en-US" sz="1600" dirty="0">
+              <a:solidFill>
+                <a:prstClr val="white">
+                  <a:lumMod val="50000"/>
+                </a:prstClr>
+              </a:solidFill>
+              <a:latin typeface="Calibri" panose="020F0502020204030204"/>
+            </a:endParaRPr>
+          </a:p>
+        </p:txBody>
+      </p:sp>
+      <p:sp>
+        <p:nvSpPr>
+          <p:cNvPr id="45" name="Flowchart: Magnetic Disk 44"/>
+          <p:cNvSpPr/>
+          <p:nvPr/>
+        </p:nvSpPr>
+        <p:spPr>
+          <a:xfrm>
+            <a:off x="4539861" y="1284051"/>
+            <a:ext cx="3251636" cy="4805022"/>
+          </a:xfrm>
+          <a:prstGeom prst="flowChartMagneticDisk">
+            <a:avLst/>
+          </a:prstGeom>
+          <a:solidFill>
+            <a:sysClr val="window" lastClr="FFFFFF"/>
+          </a:solidFill>
+          <a:ln w="76200" cap="flat" cmpd="sng" algn="ctr">
+            <a:solidFill>
+              <a:srgbClr val="7030A0"/>
+            </a:solidFill>
+            <a:prstDash val="solid"/>
+            <a:miter lim="800000"/>
+          </a:ln>
+          <a:effectLst/>
+        </p:spPr>
+        <p:txBody>
+          <a:bodyPr rtlCol="0" anchor="ctr"/>
+          <a:lstStyle/>
+          <a:p>
+            <a:pPr marL="0" marR="0" lvl="0" indent="0" algn="ctr" defTabSz="914400" eaLnBrk="1" fontAlgn="auto" latinLnBrk="0" hangingPunct="1">
+              <a:lnSpc>
+                <a:spcPct val="100000"/>
+              </a:lnSpc>
+              <a:spcBef>
+                <a:spcPts val="0"/>
+              </a:spcBef>
+              <a:spcAft>
+                <a:spcPts val="0"/>
+              </a:spcAft>
+              <a:buClrTx/>
+              <a:buSzTx/>
+              <a:buFontTx/>
+              <a:buNone/>
+              <a:tabLst/>
+              <a:defRPr/>
+            </a:pPr>
+            <a:endParaRPr kumimoji="0" lang="en-US" sz="1800" b="1" i="0" u="none" strike="noStrike" kern="0" cap="none" spc="0" normalizeH="0" baseline="0" noProof="0" dirty="0">
+              <a:ln>
+                <a:noFill/>
+              </a:ln>
+              <a:solidFill>
+                <a:prstClr val="black"/>
+              </a:solidFill>
+              <a:effectLst/>
+              <a:uLnTx/>
+              <a:uFillTx/>
+              <a:latin typeface="Calibri" panose="020F0502020204030204"/>
+              <a:ea typeface="+mn-ea"/>
+              <a:cs typeface="+mn-cs"/>
+            </a:endParaRPr>
+          </a:p>
+          <a:p>
+            <a:pPr marL="0" marR="0" lvl="0" indent="0" algn="ctr" defTabSz="914400" eaLnBrk="1" fontAlgn="auto" latinLnBrk="0" hangingPunct="1">
+              <a:lnSpc>
+                <a:spcPct val="100000"/>
+              </a:lnSpc>
+              <a:spcBef>
+                <a:spcPts val="0"/>
+              </a:spcBef>
+              <a:spcAft>
+                <a:spcPts val="0"/>
+              </a:spcAft>
+              <a:buClrTx/>
+              <a:buSzTx/>
+              <a:buFontTx/>
+              <a:buNone/>
+              <a:tabLst/>
+              <a:defRPr/>
+            </a:pPr>
+            <a:endParaRPr kumimoji="0" lang="en-US" sz="1800" b="1" i="0" u="none" strike="noStrike" kern="0" cap="none" spc="0" normalizeH="0" baseline="0" noProof="0" dirty="0">
+              <a:ln>
+                <a:noFill/>
+              </a:ln>
+              <a:solidFill>
+                <a:prstClr val="black"/>
+              </a:solidFill>
+              <a:effectLst/>
+              <a:uLnTx/>
+              <a:uFillTx/>
+              <a:latin typeface="Calibri" panose="020F0502020204030204"/>
+              <a:ea typeface="+mn-ea"/>
+              <a:cs typeface="+mn-cs"/>
+            </a:endParaRPr>
+          </a:p>
+          <a:p>
+            <a:pPr marL="0" marR="0" lvl="0" indent="0" algn="ctr" defTabSz="914400" eaLnBrk="1" fontAlgn="auto" latinLnBrk="0" hangingPunct="1">
+              <a:lnSpc>
+                <a:spcPct val="100000"/>
+              </a:lnSpc>
+              <a:spcBef>
+                <a:spcPts val="0"/>
+              </a:spcBef>
+              <a:spcAft>
+                <a:spcPts val="0"/>
+              </a:spcAft>
+              <a:buClrTx/>
+              <a:buSzTx/>
+              <a:buFontTx/>
+              <a:buNone/>
+              <a:tabLst/>
+              <a:defRPr/>
+            </a:pPr>
+            <a:endParaRPr kumimoji="0" lang="en-US" sz="1800" b="1" i="0" u="none" strike="noStrike" kern="0" cap="none" spc="0" normalizeH="0" baseline="0" noProof="0" dirty="0">
+              <a:ln>
+                <a:noFill/>
+              </a:ln>
+              <a:solidFill>
+                <a:prstClr val="black"/>
+              </a:solidFill>
+              <a:effectLst/>
+              <a:uLnTx/>
+              <a:uFillTx/>
+              <a:latin typeface="Calibri" panose="020F0502020204030204"/>
+              <a:ea typeface="+mn-ea"/>
+              <a:cs typeface="+mn-cs"/>
+            </a:endParaRPr>
+          </a:p>
+          <a:p>
+            <a:pPr marL="0" marR="0" lvl="0" indent="0" algn="ctr" defTabSz="914400" eaLnBrk="1" fontAlgn="auto" latinLnBrk="0" hangingPunct="1">
+              <a:lnSpc>
+                <a:spcPct val="100000"/>
+              </a:lnSpc>
+              <a:spcBef>
+                <a:spcPts val="0"/>
+              </a:spcBef>
+              <a:spcAft>
+                <a:spcPts val="0"/>
+              </a:spcAft>
+              <a:buClrTx/>
+              <a:buSzTx/>
+              <a:buFontTx/>
+              <a:buNone/>
+              <a:tabLst/>
+              <a:defRPr/>
+            </a:pPr>
+            <a:r>
+              <a:rPr kumimoji="0" lang="en-US" sz="2400" b="1" i="0" u="none" strike="noStrike" kern="0" cap="none" spc="0" normalizeH="0" baseline="0" noProof="0" dirty="0">
+                <a:ln>
+                  <a:noFill/>
+                </a:ln>
+                <a:solidFill>
+                  <a:prstClr val="black"/>
+                </a:solidFill>
+                <a:effectLst/>
+                <a:uLnTx/>
+                <a:uFillTx/>
+                <a:latin typeface="Calibri" panose="020F0502020204030204"/>
+                <a:ea typeface="+mn-ea"/>
+                <a:cs typeface="+mn-cs"/>
+              </a:rPr>
+              <a:t>MHDS </a:t>
+            </a:r>
+            <a:r>
+              <a:rPr kumimoji="0" lang="en-US" b="0" i="1" u="none" strike="noStrike" kern="0" cap="none" spc="0" normalizeH="0" baseline="0" noProof="0" dirty="0">
+                <a:ln>
+                  <a:noFill/>
+                </a:ln>
+                <a:solidFill>
+                  <a:prstClr val="black"/>
+                </a:solidFill>
+                <a:effectLst/>
+                <a:uLnTx/>
+                <a:uFillTx/>
+                <a:latin typeface="Calibri" panose="020F0502020204030204"/>
+                <a:ea typeface="+mn-ea"/>
+                <a:cs typeface="+mn-cs"/>
+              </a:rPr>
+              <a:t>Document Registry</a:t>
+            </a:r>
+          </a:p>
+          <a:p>
+            <a:pPr marL="0" marR="0" lvl="0" indent="0" algn="ctr" defTabSz="914400" eaLnBrk="1" fontAlgn="auto" latinLnBrk="0" hangingPunct="1">
+              <a:lnSpc>
+                <a:spcPct val="100000"/>
+              </a:lnSpc>
+              <a:spcBef>
+                <a:spcPts val="0"/>
+              </a:spcBef>
+              <a:spcAft>
+                <a:spcPts val="0"/>
+              </a:spcAft>
+              <a:buClrTx/>
+              <a:buSzTx/>
+              <a:buFontTx/>
+              <a:buNone/>
+              <a:tabLst/>
+              <a:defRPr/>
+            </a:pPr>
+            <a:r>
+              <a:rPr lang="en-US" sz="2400" b="1" kern="0" dirty="0">
+                <a:solidFill>
+                  <a:prstClr val="black"/>
+                </a:solidFill>
+                <a:latin typeface="Calibri" panose="020F0502020204030204"/>
+              </a:rPr>
+              <a:t>IUA</a:t>
+            </a:r>
+            <a:r>
+              <a:rPr lang="en-US" i="1" kern="0" dirty="0">
+                <a:solidFill>
+                  <a:prstClr val="black"/>
+                </a:solidFill>
+                <a:latin typeface="Calibri" panose="020F0502020204030204"/>
+              </a:rPr>
+              <a:t> Authorization Service</a:t>
+            </a:r>
+            <a:endParaRPr kumimoji="0" lang="en-US" b="0" i="1" u="none" strike="noStrike" kern="0" cap="none" spc="0" normalizeH="0" baseline="0" noProof="0" dirty="0">
+              <a:ln>
+                <a:noFill/>
+              </a:ln>
+              <a:solidFill>
+                <a:prstClr val="black"/>
+              </a:solidFill>
+              <a:effectLst/>
+              <a:uLnTx/>
+              <a:uFillTx/>
+              <a:latin typeface="Calibri" panose="020F0502020204030204"/>
+              <a:ea typeface="+mn-ea"/>
+              <a:cs typeface="+mn-cs"/>
+            </a:endParaRPr>
+          </a:p>
+          <a:p>
+            <a:pPr marL="0" marR="0" lvl="0" indent="0" algn="ctr" defTabSz="914400" eaLnBrk="1" fontAlgn="auto" latinLnBrk="0" hangingPunct="1">
+              <a:lnSpc>
+                <a:spcPct val="100000"/>
+              </a:lnSpc>
+              <a:spcBef>
+                <a:spcPts val="0"/>
+              </a:spcBef>
+              <a:spcAft>
+                <a:spcPts val="0"/>
+              </a:spcAft>
+              <a:buClrTx/>
+              <a:buSzTx/>
+              <a:buFontTx/>
+              <a:buNone/>
+              <a:tabLst/>
+              <a:defRPr/>
+            </a:pPr>
+            <a:r>
+              <a:rPr kumimoji="0" lang="en-US" sz="2400" b="1" i="0" u="none" strike="noStrike" kern="0" cap="none" spc="0" normalizeH="0" baseline="0" noProof="0" dirty="0">
+                <a:ln>
+                  <a:noFill/>
+                </a:ln>
+                <a:solidFill>
+                  <a:prstClr val="black"/>
+                </a:solidFill>
+                <a:effectLst/>
+                <a:uLnTx/>
+                <a:uFillTx/>
+                <a:latin typeface="Calibri" panose="020F0502020204030204"/>
+                <a:ea typeface="+mn-ea"/>
+                <a:cs typeface="+mn-cs"/>
+              </a:rPr>
+              <a:t>CA</a:t>
+            </a:r>
+            <a:r>
+              <a:rPr kumimoji="0" lang="en-US" sz="2400" b="0" i="0" u="none" strike="noStrike" kern="0" cap="none" spc="0" normalizeH="0" baseline="0" noProof="0" dirty="0">
+                <a:ln>
+                  <a:noFill/>
+                </a:ln>
+                <a:solidFill>
+                  <a:prstClr val="black"/>
+                </a:solidFill>
+                <a:effectLst/>
+                <a:uLnTx/>
+                <a:uFillTx/>
+                <a:latin typeface="Calibri" panose="020F0502020204030204"/>
+                <a:ea typeface="+mn-ea"/>
+                <a:cs typeface="+mn-cs"/>
+              </a:rPr>
+              <a:t> </a:t>
+            </a:r>
+            <a:r>
+              <a:rPr kumimoji="0" lang="en-US" b="0" i="1" u="none" strike="noStrike" kern="0" cap="none" spc="0" normalizeH="0" baseline="0" noProof="0" dirty="0">
+                <a:ln>
+                  <a:noFill/>
+                </a:ln>
+                <a:solidFill>
+                  <a:prstClr val="black"/>
+                </a:solidFill>
+                <a:effectLst/>
+                <a:uLnTx/>
+                <a:uFillTx/>
+                <a:latin typeface="Calibri" panose="020F0502020204030204"/>
+                <a:ea typeface="+mn-ea"/>
+                <a:cs typeface="+mn-cs"/>
+              </a:rPr>
+              <a:t>Certificate Authority</a:t>
+            </a:r>
+          </a:p>
+          <a:p>
+            <a:pPr marL="0" marR="0" lvl="0" indent="0" algn="ctr" defTabSz="914400" eaLnBrk="1" fontAlgn="auto" latinLnBrk="0" hangingPunct="1">
+              <a:lnSpc>
+                <a:spcPct val="100000"/>
+              </a:lnSpc>
+              <a:spcBef>
+                <a:spcPts val="0"/>
+              </a:spcBef>
+              <a:spcAft>
+                <a:spcPts val="0"/>
+              </a:spcAft>
+              <a:buClrTx/>
+              <a:buSzTx/>
+              <a:buFontTx/>
+              <a:buNone/>
+              <a:tabLst/>
+              <a:defRPr/>
+            </a:pPr>
+            <a:r>
+              <a:rPr kumimoji="0" lang="en-US" sz="2400" b="1" i="0" u="none" strike="noStrike" kern="0" cap="none" spc="0" normalizeH="0" baseline="0" noProof="0" dirty="0">
+                <a:ln>
+                  <a:noFill/>
+                </a:ln>
+                <a:solidFill>
+                  <a:prstClr val="black"/>
+                </a:solidFill>
+                <a:effectLst/>
+                <a:uLnTx/>
+                <a:uFillTx/>
+                <a:latin typeface="Calibri" panose="020F0502020204030204"/>
+                <a:ea typeface="+mn-ea"/>
+                <a:cs typeface="+mn-cs"/>
+              </a:rPr>
+              <a:t>CT</a:t>
+            </a:r>
+            <a:r>
+              <a:rPr kumimoji="0" lang="en-US" sz="2400" b="0" i="0" u="none" strike="noStrike" kern="0" cap="none" spc="0" normalizeH="0" baseline="0" noProof="0" dirty="0">
+                <a:ln>
+                  <a:noFill/>
+                </a:ln>
+                <a:solidFill>
+                  <a:prstClr val="black"/>
+                </a:solidFill>
+                <a:effectLst/>
+                <a:uLnTx/>
+                <a:uFillTx/>
+                <a:latin typeface="Calibri" panose="020F0502020204030204"/>
+                <a:ea typeface="+mn-ea"/>
+                <a:cs typeface="+mn-cs"/>
+              </a:rPr>
+              <a:t> </a:t>
+            </a:r>
+            <a:r>
+              <a:rPr kumimoji="0" lang="en-US" b="0" i="1" u="none" strike="noStrike" kern="0" cap="none" spc="0" normalizeH="0" baseline="0" noProof="0" dirty="0">
+                <a:ln>
+                  <a:noFill/>
+                </a:ln>
+                <a:solidFill>
+                  <a:prstClr val="black"/>
+                </a:solidFill>
+                <a:effectLst/>
+                <a:uLnTx/>
+                <a:uFillTx/>
+                <a:latin typeface="Calibri" panose="020F0502020204030204"/>
+                <a:ea typeface="+mn-ea"/>
+                <a:cs typeface="+mn-cs"/>
+              </a:rPr>
+              <a:t>Time Service</a:t>
+            </a:r>
+          </a:p>
+          <a:p>
+            <a:pPr marL="0" marR="0" lvl="0" indent="0" algn="ctr" defTabSz="914400" eaLnBrk="1" fontAlgn="auto" latinLnBrk="0" hangingPunct="1">
+              <a:lnSpc>
+                <a:spcPct val="100000"/>
+              </a:lnSpc>
+              <a:spcBef>
+                <a:spcPts val="0"/>
+              </a:spcBef>
+              <a:spcAft>
+                <a:spcPts val="0"/>
+              </a:spcAft>
+              <a:buClrTx/>
+              <a:buSzTx/>
+              <a:buFontTx/>
+              <a:buNone/>
+              <a:tabLst/>
+              <a:defRPr/>
+            </a:pPr>
+            <a:r>
+              <a:rPr kumimoji="0" lang="en-US" sz="2400" b="1" i="0" u="none" strike="noStrike" kern="0" cap="none" spc="0" normalizeH="0" baseline="0" noProof="0" dirty="0">
+                <a:ln>
+                  <a:noFill/>
+                </a:ln>
+                <a:solidFill>
+                  <a:prstClr val="black"/>
+                </a:solidFill>
+                <a:effectLst/>
+                <a:uLnTx/>
+                <a:uFillTx/>
+                <a:latin typeface="Calibri" panose="020F0502020204030204"/>
+                <a:ea typeface="+mn-ea"/>
+                <a:cs typeface="+mn-cs"/>
+              </a:rPr>
+              <a:t>PMIR</a:t>
+            </a:r>
+            <a:r>
+              <a:rPr kumimoji="0" lang="en-US" sz="2400" b="0" i="0" u="none" strike="noStrike" kern="0" cap="none" spc="0" normalizeH="0" baseline="0" noProof="0" dirty="0">
+                <a:ln>
+                  <a:noFill/>
+                </a:ln>
+                <a:solidFill>
+                  <a:prstClr val="black"/>
+                </a:solidFill>
+                <a:effectLst/>
+                <a:uLnTx/>
+                <a:uFillTx/>
+                <a:latin typeface="Calibri" panose="020F0502020204030204"/>
+                <a:ea typeface="+mn-ea"/>
+                <a:cs typeface="+mn-cs"/>
+              </a:rPr>
+              <a:t> </a:t>
+            </a:r>
+            <a:r>
+              <a:rPr kumimoji="0" lang="en-US" b="0" i="1" u="none" strike="noStrike" kern="0" cap="none" spc="0" normalizeH="0" baseline="0" noProof="0" dirty="0">
+                <a:ln>
+                  <a:noFill/>
+                </a:ln>
+                <a:solidFill>
+                  <a:prstClr val="black"/>
+                </a:solidFill>
+                <a:effectLst/>
+                <a:uLnTx/>
+                <a:uFillTx/>
+                <a:latin typeface="Calibri" panose="020F0502020204030204"/>
+                <a:ea typeface="+mn-ea"/>
+                <a:cs typeface="+mn-cs"/>
+              </a:rPr>
+              <a:t>Patient </a:t>
+            </a:r>
+            <a:r>
+              <a:rPr lang="en-US" i="1" kern="0" dirty="0">
+                <a:solidFill>
+                  <a:prstClr val="black"/>
+                </a:solidFill>
+                <a:latin typeface="Calibri" panose="020F0502020204030204"/>
+              </a:rPr>
+              <a:t>Id Management</a:t>
+            </a:r>
+            <a:endParaRPr kumimoji="0" lang="en-US" b="0" i="1" u="none" strike="noStrike" kern="0" cap="none" spc="0" normalizeH="0" baseline="0" noProof="0" dirty="0">
+              <a:ln>
+                <a:noFill/>
+              </a:ln>
+              <a:solidFill>
+                <a:prstClr val="black"/>
+              </a:solidFill>
+              <a:effectLst/>
+              <a:uLnTx/>
+              <a:uFillTx/>
+              <a:latin typeface="Calibri" panose="020F0502020204030204"/>
+              <a:ea typeface="+mn-ea"/>
+              <a:cs typeface="+mn-cs"/>
+            </a:endParaRPr>
+          </a:p>
+          <a:p>
+            <a:pPr marL="0" marR="0" lvl="0" indent="0" algn="ctr" defTabSz="914400" eaLnBrk="1" fontAlgn="auto" latinLnBrk="0" hangingPunct="1">
+              <a:lnSpc>
+                <a:spcPct val="100000"/>
+              </a:lnSpc>
+              <a:spcBef>
+                <a:spcPts val="0"/>
+              </a:spcBef>
+              <a:spcAft>
+                <a:spcPts val="0"/>
+              </a:spcAft>
+              <a:buClrTx/>
+              <a:buSzTx/>
+              <a:buFontTx/>
+              <a:buNone/>
+              <a:tabLst/>
+              <a:defRPr/>
+            </a:pPr>
+            <a:r>
+              <a:rPr kumimoji="0" lang="en-US" sz="2400" b="1" i="0" u="none" strike="noStrike" kern="0" cap="none" spc="0" normalizeH="0" baseline="0" noProof="0" dirty="0">
+                <a:ln>
+                  <a:noFill/>
+                </a:ln>
+                <a:solidFill>
+                  <a:prstClr val="black"/>
+                </a:solidFill>
+                <a:effectLst/>
+                <a:uLnTx/>
+                <a:uFillTx/>
+                <a:latin typeface="Calibri" panose="020F0502020204030204"/>
+                <a:ea typeface="+mn-ea"/>
+                <a:cs typeface="+mn-cs"/>
+              </a:rPr>
+              <a:t>SVCM </a:t>
+            </a:r>
+            <a:r>
+              <a:rPr kumimoji="0" lang="en-US" b="0" i="1" u="none" strike="noStrike" kern="0" cap="none" spc="0" normalizeH="0" baseline="0" noProof="0" dirty="0">
+                <a:ln>
+                  <a:noFill/>
+                </a:ln>
+                <a:solidFill>
+                  <a:prstClr val="black"/>
+                </a:solidFill>
+                <a:effectLst/>
+                <a:uLnTx/>
+                <a:uFillTx/>
+                <a:latin typeface="Calibri" panose="020F0502020204030204"/>
+                <a:ea typeface="+mn-ea"/>
+                <a:cs typeface="+mn-cs"/>
+              </a:rPr>
+              <a:t>Vocab Management</a:t>
+            </a:r>
+          </a:p>
+          <a:p>
+            <a:pPr marL="0" marR="0" lvl="0" indent="0" algn="ctr" defTabSz="914400" eaLnBrk="1" fontAlgn="auto" latinLnBrk="0" hangingPunct="1">
+              <a:lnSpc>
+                <a:spcPct val="100000"/>
+              </a:lnSpc>
+              <a:spcBef>
+                <a:spcPts val="0"/>
+              </a:spcBef>
+              <a:spcAft>
+                <a:spcPts val="0"/>
+              </a:spcAft>
+              <a:buClrTx/>
+              <a:buSzTx/>
+              <a:buFontTx/>
+              <a:buNone/>
+              <a:tabLst/>
+              <a:defRPr/>
+            </a:pPr>
+            <a:r>
+              <a:rPr kumimoji="0" lang="en-US" sz="2400" b="1" i="0" u="none" strike="noStrike" kern="0" cap="none" spc="0" normalizeH="0" baseline="0" noProof="0" dirty="0">
+                <a:ln>
+                  <a:noFill/>
+                </a:ln>
+                <a:solidFill>
+                  <a:prstClr val="black"/>
+                </a:solidFill>
+                <a:effectLst/>
+                <a:uLnTx/>
+                <a:uFillTx/>
+                <a:latin typeface="Calibri" panose="020F0502020204030204"/>
+                <a:ea typeface="+mn-ea"/>
+                <a:cs typeface="+mn-cs"/>
+              </a:rPr>
+              <a:t>ATNA</a:t>
+            </a:r>
+            <a:r>
+              <a:rPr kumimoji="0" lang="en-US" sz="2400" b="0" i="0" u="none" strike="noStrike" kern="0" cap="none" spc="0" normalizeH="0" baseline="0" noProof="0" dirty="0">
+                <a:ln>
+                  <a:noFill/>
+                </a:ln>
+                <a:solidFill>
+                  <a:prstClr val="black"/>
+                </a:solidFill>
+                <a:effectLst/>
+                <a:uLnTx/>
+                <a:uFillTx/>
+                <a:latin typeface="Calibri" panose="020F0502020204030204"/>
+                <a:ea typeface="+mn-ea"/>
+                <a:cs typeface="+mn-cs"/>
+              </a:rPr>
+              <a:t> </a:t>
+            </a:r>
+            <a:r>
+              <a:rPr kumimoji="0" lang="en-US" b="0" i="1" u="none" strike="noStrike" kern="0" cap="none" spc="0" normalizeH="0" baseline="0" noProof="0" dirty="0">
+                <a:ln>
+                  <a:noFill/>
+                </a:ln>
+                <a:solidFill>
+                  <a:prstClr val="black"/>
+                </a:solidFill>
+                <a:effectLst/>
+                <a:uLnTx/>
+                <a:uFillTx/>
+                <a:latin typeface="Calibri" panose="020F0502020204030204"/>
+                <a:ea typeface="+mn-ea"/>
+                <a:cs typeface="+mn-cs"/>
+              </a:rPr>
+              <a:t>Audit Record Repository</a:t>
+            </a:r>
+          </a:p>
+          <a:p>
+            <a:pPr marL="0" marR="0" lvl="0" indent="0" algn="ctr" defTabSz="914400" eaLnBrk="1" fontAlgn="auto" latinLnBrk="0" hangingPunct="1">
+              <a:lnSpc>
+                <a:spcPct val="100000"/>
+              </a:lnSpc>
+              <a:spcBef>
+                <a:spcPts val="0"/>
+              </a:spcBef>
+              <a:spcAft>
+                <a:spcPts val="0"/>
+              </a:spcAft>
+              <a:buClrTx/>
+              <a:buSzTx/>
+              <a:buFontTx/>
+              <a:buNone/>
+              <a:tabLst/>
+              <a:defRPr/>
+            </a:pPr>
+            <a:r>
+              <a:rPr kumimoji="0" lang="en-US" sz="2400" b="1" i="0" u="none" strike="noStrike" kern="0" cap="none" spc="0" normalizeH="0" baseline="0" noProof="0" dirty="0">
+                <a:ln>
+                  <a:noFill/>
+                </a:ln>
+                <a:solidFill>
+                  <a:prstClr val="black"/>
+                </a:solidFill>
+                <a:effectLst/>
+                <a:uLnTx/>
+                <a:uFillTx/>
+                <a:latin typeface="Calibri" panose="020F0502020204030204"/>
+                <a:ea typeface="+mn-ea"/>
+                <a:cs typeface="+mn-cs"/>
+              </a:rPr>
+              <a:t>mCSD</a:t>
+            </a:r>
+            <a:r>
+              <a:rPr kumimoji="0" lang="en-US" sz="2400" b="0" i="0" u="none" strike="noStrike" kern="0" cap="none" spc="0" normalizeH="0" baseline="0" noProof="0" dirty="0">
+                <a:ln>
+                  <a:noFill/>
+                </a:ln>
+                <a:solidFill>
+                  <a:prstClr val="black"/>
+                </a:solidFill>
+                <a:effectLst/>
+                <a:uLnTx/>
+                <a:uFillTx/>
+                <a:latin typeface="Calibri" panose="020F0502020204030204"/>
+                <a:ea typeface="+mn-ea"/>
+                <a:cs typeface="+mn-cs"/>
+              </a:rPr>
+              <a:t> </a:t>
+            </a:r>
+            <a:r>
+              <a:rPr kumimoji="0" lang="en-US" b="0" i="1" u="none" strike="noStrike" kern="0" cap="none" spc="0" normalizeH="0" baseline="0" noProof="0" dirty="0">
+                <a:ln>
+                  <a:noFill/>
+                </a:ln>
+                <a:solidFill>
+                  <a:prstClr val="black"/>
+                </a:solidFill>
+                <a:effectLst/>
+                <a:uLnTx/>
+                <a:uFillTx/>
+                <a:latin typeface="Calibri" panose="020F0502020204030204"/>
+                <a:ea typeface="+mn-ea"/>
+                <a:cs typeface="+mn-cs"/>
+              </a:rPr>
+              <a:t>Provider Directory</a:t>
+            </a:r>
+          </a:p>
+        </p:txBody>
+      </p:sp>
+      <p:pic>
+        <p:nvPicPr>
+          <p:cNvPr id="50" name="Graphic 17">
+            <a:extLst>
+              <a:ext uri="{FF2B5EF4-FFF2-40B4-BE49-F238E27FC236}">
+                <a16:creationId xmlns:a16="http://schemas.microsoft.com/office/drawing/2014/main" id="{056BD314-7081-6B44-8D40-EDE604FF3CB0}"/>
+              </a:ext>
+            </a:extLst>
+          </p:cNvPr>
+          <p:cNvPicPr>
+            <a:picLocks noChangeAspect="1"/>
+          </p:cNvPicPr>
+          <p:nvPr/>
+        </p:nvPicPr>
+        <p:blipFill>
+          <a:blip r:embed="rId6" cstate="print">
+            <a:extLst>
+              <a:ext uri="{28A0092B-C50C-407E-A947-70E740481C1C}">
+                <a14:useLocalDpi xmlns:a14="http://schemas.microsoft.com/office/drawing/2010/main" val="0"/>
+              </a:ext>
+              <a:ext uri="{96DAC541-7B7A-43D3-8B79-37D633B846F1}">
+                <asvg:svgBlip xmlns:asvg="http://schemas.microsoft.com/office/drawing/2016/SVG/main" r:embed="rId7"/>
+              </a:ext>
+            </a:extLst>
+          </a:blip>
+          <a:stretch>
+            <a:fillRect/>
+          </a:stretch>
+        </p:blipFill>
+        <p:spPr>
+          <a:xfrm>
+            <a:off x="10009099" y="4277101"/>
+            <a:ext cx="255417" cy="207898"/>
+          </a:xfrm>
+          <a:prstGeom prst="rect">
+            <a:avLst/>
+          </a:prstGeom>
+        </p:spPr>
+      </p:pic>
+      <p:pic>
+        <p:nvPicPr>
+          <p:cNvPr id="51" name="Graphic 22">
+            <a:extLst>
+              <a:ext uri="{FF2B5EF4-FFF2-40B4-BE49-F238E27FC236}">
+                <a16:creationId xmlns:a16="http://schemas.microsoft.com/office/drawing/2014/main" id="{FF61B486-1C74-AC4C-9588-497291980B60}"/>
+              </a:ext>
+            </a:extLst>
+          </p:cNvPr>
+          <p:cNvPicPr>
+            <a:picLocks noChangeAspect="1"/>
+          </p:cNvPicPr>
+          <p:nvPr/>
+        </p:nvPicPr>
+        <p:blipFill>
+          <a:blip r:embed="rId8" cstate="print">
+            <a:extLst>
+              <a:ext uri="{28A0092B-C50C-407E-A947-70E740481C1C}">
+                <a14:useLocalDpi xmlns:a14="http://schemas.microsoft.com/office/drawing/2010/main" val="0"/>
+              </a:ext>
+              <a:ext uri="{96DAC541-7B7A-43D3-8B79-37D633B846F1}">
+                <asvg:svgBlip xmlns:asvg="http://schemas.microsoft.com/office/drawing/2016/SVG/main" r:embed="rId9"/>
+              </a:ext>
+            </a:extLst>
+          </a:blip>
+          <a:stretch>
+            <a:fillRect/>
+          </a:stretch>
+        </p:blipFill>
+        <p:spPr>
+          <a:xfrm flipH="1" flipV="1">
+            <a:off x="2452511" y="4144325"/>
+            <a:ext cx="223975" cy="343961"/>
+          </a:xfrm>
+          <a:prstGeom prst="rect">
+            <a:avLst/>
+          </a:prstGeom>
+        </p:spPr>
+      </p:pic>
+      <p:sp>
+        <p:nvSpPr>
+          <p:cNvPr id="53" name="Right Arrow 52"/>
+          <p:cNvSpPr/>
+          <p:nvPr/>
+        </p:nvSpPr>
+        <p:spPr>
+          <a:xfrm rot="10800000">
+            <a:off x="8250276" y="1084352"/>
+            <a:ext cx="3895758" cy="5418168"/>
+          </a:xfrm>
+          <a:prstGeom prst="rightArrow">
+            <a:avLst/>
+          </a:prstGeom>
+          <a:noFill/>
+          <a:ln w="76200" cap="flat" cmpd="sng" algn="ctr">
+            <a:solidFill>
+              <a:srgbClr val="A5A5A5">
+                <a:lumMod val="40000"/>
+                <a:lumOff val="60000"/>
+              </a:srgbClr>
+            </a:solidFill>
+            <a:prstDash val="dash"/>
+            <a:miter lim="800000"/>
+          </a:ln>
+          <a:effectLst/>
+        </p:spPr>
+        <p:txBody>
+          <a:bodyPr rtlCol="0" anchor="ctr"/>
+          <a:lstStyle/>
+          <a:p>
+            <a:pPr marL="0" marR="0" lvl="0" indent="0" algn="ctr" defTabSz="914400" eaLnBrk="1" fontAlgn="auto" latinLnBrk="0" hangingPunct="1">
+              <a:lnSpc>
+                <a:spcPct val="100000"/>
+              </a:lnSpc>
+              <a:spcBef>
+                <a:spcPts val="0"/>
+              </a:spcBef>
+              <a:spcAft>
+                <a:spcPts val="0"/>
+              </a:spcAft>
+              <a:buClrTx/>
+              <a:buSzTx/>
+              <a:buFontTx/>
+              <a:buNone/>
+              <a:tabLst/>
+              <a:defRPr/>
+            </a:pPr>
+            <a:endParaRPr kumimoji="0" lang="en-US" sz="1800" b="0" i="0" u="none" strike="noStrike" kern="0" cap="none" spc="0" normalizeH="0" baseline="0" noProof="0">
+              <a:ln>
+                <a:noFill/>
+              </a:ln>
+              <a:solidFill>
+                <a:prstClr val="white"/>
+              </a:solidFill>
+              <a:effectLst/>
+              <a:uLnTx/>
+              <a:uFillTx/>
+              <a:latin typeface="Calibri" panose="020F0502020204030204"/>
+              <a:ea typeface="+mn-ea"/>
+              <a:cs typeface="+mn-cs"/>
+            </a:endParaRPr>
+          </a:p>
+        </p:txBody>
+      </p:sp>
+      <p:sp>
+        <p:nvSpPr>
+          <p:cNvPr id="54" name="TextBox 53"/>
+          <p:cNvSpPr txBox="1"/>
+          <p:nvPr/>
+        </p:nvSpPr>
+        <p:spPr>
+          <a:xfrm>
+            <a:off x="4523248" y="1423125"/>
+            <a:ext cx="3326860" cy="830997"/>
+          </a:xfrm>
+          <a:prstGeom prst="rect">
+            <a:avLst/>
+          </a:prstGeom>
+          <a:noFill/>
+        </p:spPr>
+        <p:txBody>
+          <a:bodyPr wrap="square" rtlCol="0">
+            <a:spAutoFit/>
+          </a:bodyPr>
+          <a:lstStyle/>
+          <a:p>
+            <a:pPr algn="ctr" defTabSz="914400"/>
+            <a:r>
+              <a:rPr lang="en-US" sz="4800" b="1" dirty="0">
+                <a:solidFill>
+                  <a:prstClr val="black"/>
+                </a:solidFill>
+                <a:latin typeface="Calibri" panose="020F0502020204030204"/>
+              </a:rPr>
+              <a:t>Services</a:t>
+            </a:r>
+          </a:p>
+        </p:txBody>
+      </p:sp>
+      <p:sp>
+        <p:nvSpPr>
+          <p:cNvPr id="55" name="TextBox 54"/>
+          <p:cNvSpPr txBox="1"/>
+          <p:nvPr/>
+        </p:nvSpPr>
+        <p:spPr>
+          <a:xfrm>
+            <a:off x="8186474" y="3593381"/>
+            <a:ext cx="1147627" cy="400110"/>
+          </a:xfrm>
+          <a:prstGeom prst="rect">
+            <a:avLst/>
+          </a:prstGeom>
+          <a:noFill/>
+        </p:spPr>
+        <p:txBody>
+          <a:bodyPr wrap="square" rtlCol="0">
+            <a:spAutoFit/>
+          </a:bodyPr>
+          <a:lstStyle/>
+          <a:p>
+            <a:pPr algn="ctr" defTabSz="914400"/>
+            <a:r>
+              <a:rPr lang="en-US" sz="2000" b="1" dirty="0">
+                <a:solidFill>
+                  <a:prstClr val="black"/>
+                </a:solidFill>
+                <a:latin typeface="Calibri" panose="020F0502020204030204"/>
+              </a:rPr>
+              <a:t>Pull</a:t>
+            </a:r>
+          </a:p>
+        </p:txBody>
+      </p:sp>
+      <p:sp>
+        <p:nvSpPr>
+          <p:cNvPr id="56" name="TextBox 55"/>
+          <p:cNvSpPr txBox="1"/>
+          <p:nvPr/>
+        </p:nvSpPr>
+        <p:spPr>
+          <a:xfrm>
+            <a:off x="2928813" y="3593381"/>
+            <a:ext cx="1147627" cy="400110"/>
+          </a:xfrm>
+          <a:prstGeom prst="rect">
+            <a:avLst/>
+          </a:prstGeom>
+          <a:noFill/>
+        </p:spPr>
+        <p:txBody>
+          <a:bodyPr wrap="square" rtlCol="0">
+            <a:spAutoFit/>
+          </a:bodyPr>
+          <a:lstStyle/>
+          <a:p>
+            <a:pPr algn="ctr" defTabSz="914400"/>
+            <a:r>
+              <a:rPr lang="en-US" sz="2000" b="1" dirty="0">
+                <a:solidFill>
+                  <a:prstClr val="black"/>
+                </a:solidFill>
+                <a:latin typeface="Calibri" panose="020F0502020204030204"/>
+              </a:rPr>
+              <a:t>Push</a:t>
+            </a:r>
+          </a:p>
+        </p:txBody>
+      </p:sp>
+      <p:sp>
+        <p:nvSpPr>
+          <p:cNvPr id="57" name="Right Arrow 56"/>
+          <p:cNvSpPr/>
+          <p:nvPr/>
+        </p:nvSpPr>
+        <p:spPr>
+          <a:xfrm>
+            <a:off x="44601" y="1011794"/>
+            <a:ext cx="4018457" cy="5418168"/>
+          </a:xfrm>
+          <a:prstGeom prst="rightArrow">
+            <a:avLst/>
+          </a:prstGeom>
+          <a:noFill/>
+          <a:ln w="76200" cap="flat" cmpd="sng" algn="ctr">
+            <a:solidFill>
+              <a:srgbClr val="A5A5A5">
+                <a:lumMod val="40000"/>
+                <a:lumOff val="60000"/>
+              </a:srgbClr>
+            </a:solidFill>
+            <a:prstDash val="dash"/>
+            <a:miter lim="800000"/>
+          </a:ln>
+          <a:effectLst/>
+        </p:spPr>
+        <p:txBody>
+          <a:bodyPr rtlCol="0" anchor="ctr"/>
+          <a:lstStyle/>
+          <a:p>
+            <a:pPr marL="0" marR="0" lvl="0" indent="0" algn="ctr" defTabSz="914400" eaLnBrk="1" fontAlgn="auto" latinLnBrk="0" hangingPunct="1">
+              <a:lnSpc>
+                <a:spcPct val="100000"/>
+              </a:lnSpc>
+              <a:spcBef>
+                <a:spcPts val="0"/>
+              </a:spcBef>
+              <a:spcAft>
+                <a:spcPts val="0"/>
+              </a:spcAft>
+              <a:buClrTx/>
+              <a:buSzTx/>
+              <a:buFontTx/>
+              <a:buNone/>
+              <a:tabLst/>
+              <a:defRPr/>
+            </a:pPr>
+            <a:endParaRPr kumimoji="0" lang="en-US" sz="1800" b="0" i="0" u="none" strike="noStrike" kern="0" cap="none" spc="0" normalizeH="0" baseline="0" noProof="0">
+              <a:ln>
+                <a:noFill/>
+              </a:ln>
+              <a:solidFill>
+                <a:prstClr val="white"/>
+              </a:solidFill>
+              <a:effectLst/>
+              <a:uLnTx/>
+              <a:uFillTx/>
+              <a:latin typeface="Calibri" panose="020F0502020204030204"/>
+              <a:ea typeface="+mn-ea"/>
+              <a:cs typeface="+mn-cs"/>
+            </a:endParaRPr>
+          </a:p>
+        </p:txBody>
+      </p:sp>
+    </p:spTree>
+    <p:extLst>
+      <p:ext uri="{BB962C8B-B14F-4D97-AF65-F5344CB8AC3E}">
+        <p14:creationId xmlns:p14="http://schemas.microsoft.com/office/powerpoint/2010/main" val="2765196792"/>
+      </p:ext>
+    </p:extLst>
+  </p:cSld>
+  <p:clrMapOvr>
+    <a:masterClrMapping/>
+  </p:clrMapOvr>
+  <mc:AlternateContent xmlns:mc="http://schemas.openxmlformats.org/markup-compatibility/2006" xmlns:p14="http://schemas.microsoft.com/office/powerpoint/2010/main">
+    <mc:Choice Requires="p14">
+      <p:transition p14:dur="0" advClick="0"/>
+    </mc:Choice>
+    <mc:Fallback xmlns="">
+      <p:transition advClick="0"/>
+    </mc:Fallback>
+  </mc:AlternateContent>
 </p:sld>
 </file>
 

</xml_diff>

<commit_message>
Final committee comments integrated
</commit_message>
<xml_diff>
--- a/MHDS/Diagrams.pptx
+++ b/MHDS/Diagrams.pptx
@@ -267,7 +267,7 @@
           <a:p>
             <a:fld id="{03431FED-738C-45FE-8DA9-95C611B1D2F8}" type="datetimeFigureOut">
               <a:rPr lang="en-US" smtClean="0"/>
-              <a:t>2/18/2020</a:t>
+              <a:t>2/20/2020</a:t>
             </a:fld>
             <a:endParaRPr lang="en-US"/>
           </a:p>
@@ -465,7 +465,7 @@
           <a:p>
             <a:fld id="{03431FED-738C-45FE-8DA9-95C611B1D2F8}" type="datetimeFigureOut">
               <a:rPr lang="en-US" smtClean="0"/>
-              <a:t>2/18/2020</a:t>
+              <a:t>2/20/2020</a:t>
             </a:fld>
             <a:endParaRPr lang="en-US"/>
           </a:p>
@@ -673,7 +673,7 @@
           <a:p>
             <a:fld id="{03431FED-738C-45FE-8DA9-95C611B1D2F8}" type="datetimeFigureOut">
               <a:rPr lang="en-US" smtClean="0"/>
-              <a:t>2/18/2020</a:t>
+              <a:t>2/20/2020</a:t>
             </a:fld>
             <a:endParaRPr lang="en-US"/>
           </a:p>
@@ -954,7 +954,7 @@
           <a:p>
             <a:fld id="{BFF328E6-E46B-6E40-8B27-5B2DDCCC311D}" type="datetime1">
               <a:rPr lang="en-US" smtClean="0"/>
-              <a:t>2/18/2020</a:t>
+              <a:t>2/20/2020</a:t>
             </a:fld>
             <a:endParaRPr lang="en-US" dirty="0"/>
           </a:p>
@@ -1576,7 +1576,7 @@
           <a:p>
             <a:fld id="{03431FED-738C-45FE-8DA9-95C611B1D2F8}" type="datetimeFigureOut">
               <a:rPr lang="en-US" smtClean="0"/>
-              <a:t>2/18/2020</a:t>
+              <a:t>2/20/2020</a:t>
             </a:fld>
             <a:endParaRPr lang="en-US"/>
           </a:p>
@@ -1851,7 +1851,7 @@
           <a:p>
             <a:fld id="{03431FED-738C-45FE-8DA9-95C611B1D2F8}" type="datetimeFigureOut">
               <a:rPr lang="en-US" smtClean="0"/>
-              <a:t>2/18/2020</a:t>
+              <a:t>2/20/2020</a:t>
             </a:fld>
             <a:endParaRPr lang="en-US"/>
           </a:p>
@@ -2116,7 +2116,7 @@
           <a:p>
             <a:fld id="{03431FED-738C-45FE-8DA9-95C611B1D2F8}" type="datetimeFigureOut">
               <a:rPr lang="en-US" smtClean="0"/>
-              <a:t>2/18/2020</a:t>
+              <a:t>2/20/2020</a:t>
             </a:fld>
             <a:endParaRPr lang="en-US"/>
           </a:p>
@@ -2528,7 +2528,7 @@
           <a:p>
             <a:fld id="{03431FED-738C-45FE-8DA9-95C611B1D2F8}" type="datetimeFigureOut">
               <a:rPr lang="en-US" smtClean="0"/>
-              <a:t>2/18/2020</a:t>
+              <a:t>2/20/2020</a:t>
             </a:fld>
             <a:endParaRPr lang="en-US"/>
           </a:p>
@@ -2669,7 +2669,7 @@
           <a:p>
             <a:fld id="{03431FED-738C-45FE-8DA9-95C611B1D2F8}" type="datetimeFigureOut">
               <a:rPr lang="en-US" smtClean="0"/>
-              <a:t>2/18/2020</a:t>
+              <a:t>2/20/2020</a:t>
             </a:fld>
             <a:endParaRPr lang="en-US"/>
           </a:p>
@@ -2782,7 +2782,7 @@
           <a:p>
             <a:fld id="{03431FED-738C-45FE-8DA9-95C611B1D2F8}" type="datetimeFigureOut">
               <a:rPr lang="en-US" smtClean="0"/>
-              <a:t>2/18/2020</a:t>
+              <a:t>2/20/2020</a:t>
             </a:fld>
             <a:endParaRPr lang="en-US"/>
           </a:p>
@@ -3093,7 +3093,7 @@
           <a:p>
             <a:fld id="{03431FED-738C-45FE-8DA9-95C611B1D2F8}" type="datetimeFigureOut">
               <a:rPr lang="en-US" smtClean="0"/>
-              <a:t>2/18/2020</a:t>
+              <a:t>2/20/2020</a:t>
             </a:fld>
             <a:endParaRPr lang="en-US"/>
           </a:p>
@@ -3381,7 +3381,7 @@
           <a:p>
             <a:fld id="{03431FED-738C-45FE-8DA9-95C611B1D2F8}" type="datetimeFigureOut">
               <a:rPr lang="en-US" smtClean="0"/>
-              <a:t>2/18/2020</a:t>
+              <a:t>2/20/2020</a:t>
             </a:fld>
             <a:endParaRPr lang="en-US"/>
           </a:p>
@@ -3622,7 +3622,7 @@
           <a:p>
             <a:fld id="{03431FED-738C-45FE-8DA9-95C611B1D2F8}" type="datetimeFigureOut">
               <a:rPr lang="en-US" smtClean="0"/>
-              <a:t>2/18/2020</a:t>
+              <a:t>2/20/2020</a:t>
             </a:fld>
             <a:endParaRPr lang="en-US"/>
           </a:p>
@@ -12103,7 +12103,7 @@
         <p:spPr>
           <a:xfrm>
             <a:off x="143462" y="2692708"/>
-            <a:ext cx="3368102" cy="954107"/>
+            <a:ext cx="3044295" cy="954107"/>
           </a:xfrm>
           <a:prstGeom prst="rect">
             <a:avLst/>
@@ -12126,7 +12126,7 @@
                 </a:solidFill>
                 <a:latin typeface="Calibri" panose="020F0502020204030204"/>
               </a:rPr>
-              <a:t>System that</a:t>
+              <a:t>Systems that</a:t>
             </a:r>
           </a:p>
           <a:p>
@@ -12140,7 +12140,7 @@
                 </a:solidFill>
                 <a:latin typeface="Calibri" panose="020F0502020204030204"/>
               </a:rPr>
-              <a:t>Publishes Documents</a:t>
+              <a:t>Publish Documents</a:t>
             </a:r>
           </a:p>
         </p:txBody>
@@ -12154,7 +12154,7 @@
         <p:spPr>
           <a:xfrm>
             <a:off x="8671560" y="2610005"/>
-            <a:ext cx="3519078" cy="954107"/>
+            <a:ext cx="3376978" cy="954107"/>
           </a:xfrm>
           <a:prstGeom prst="rect">
             <a:avLst/>
@@ -12177,7 +12177,7 @@
                 </a:solidFill>
                 <a:latin typeface="Calibri" panose="020F0502020204030204"/>
               </a:rPr>
-              <a:t>System that </a:t>
+              <a:t>Systems that </a:t>
             </a:r>
           </a:p>
           <a:p>
@@ -12191,7 +12191,7 @@
                 </a:solidFill>
                 <a:latin typeface="Calibri" panose="020F0502020204030204"/>
               </a:rPr>
-              <a:t>Consumes Documents</a:t>
+              <a:t>Consume Documents</a:t>
             </a:r>
             <a:endParaRPr lang="en-US" sz="1600" dirty="0">
               <a:solidFill>
@@ -12351,23 +12351,6 @@
               <a:defRPr/>
             </a:pPr>
             <a:r>
-              <a:rPr kumimoji="0" lang="en-US" sz="2400" b="1" i="0" u="none" strike="noStrike" kern="0" cap="none" spc="0" normalizeH="0" baseline="0" noProof="0" dirty="0">
-                <a:ln>
-                  <a:noFill/>
-                </a:ln>
-                <a:solidFill>
-                  <a:prstClr val="black"/>
-                </a:solidFill>
-                <a:effectLst/>
-                <a:uLnTx/>
-                <a:uFillTx/>
-                <a:latin typeface="Calibri" panose="020F0502020204030204"/>
-                <a:ea typeface="+mn-ea"/>
-                <a:cs typeface="+mn-cs"/>
-              </a:rPr>
-              <a:t>MHDS </a:t>
-            </a:r>
-            <a:r>
               <a:rPr kumimoji="0" lang="en-US" b="0" i="1" u="none" strike="noStrike" kern="0" cap="none" spc="0" normalizeH="0" baseline="0" noProof="0" dirty="0">
                 <a:ln>
                   <a:noFill/>
@@ -12404,22 +12387,13 @@
               <a:defRPr/>
             </a:pPr>
             <a:r>
-              <a:rPr lang="en-US" sz="2400" b="1" kern="0" dirty="0">
-                <a:solidFill>
-                  <a:prstClr val="black"/>
-                </a:solidFill>
-                <a:latin typeface="Calibri" panose="020F0502020204030204"/>
-              </a:rPr>
-              <a:t>IUA</a:t>
-            </a:r>
-            <a:r>
               <a:rPr lang="en-US" i="1" kern="0" dirty="0">
                 <a:solidFill>
                   <a:prstClr val="black"/>
                 </a:solidFill>
                 <a:latin typeface="Calibri" panose="020F0502020204030204"/>
               </a:rPr>
-              <a:t> Authorization Service</a:t>
+              <a:t>Authorization Service</a:t>
             </a:r>
             <a:endParaRPr kumimoji="0" lang="en-US" b="0" i="1" u="none" strike="noStrike" kern="0" cap="none" spc="0" normalizeH="0" baseline="0" noProof="0" dirty="0">
               <a:ln>
@@ -12455,40 +12429,6 @@
               <a:defRPr/>
             </a:pPr>
             <a:r>
-              <a:rPr kumimoji="0" lang="en-US" sz="2400" b="1" i="0" u="none" strike="noStrike" kern="0" cap="none" spc="0" normalizeH="0" baseline="0" noProof="0" dirty="0">
-                <a:ln>
-                  <a:noFill/>
-                </a:ln>
-                <a:solidFill>
-                  <a:prstClr val="black"/>
-                </a:solidFill>
-                <a:effectLst/>
-                <a:uLnTx/>
-                <a:uFillTx/>
-                <a:latin typeface="Calibri" panose="020F0502020204030204"/>
-                <a:ea typeface="+mn-ea"/>
-                <a:cs typeface="+mn-cs"/>
-              </a:rPr>
-              <a:t>CA</a:t>
-            </a:r>
-            <a:r>
-              <a:rPr kumimoji="0" lang="en-US" sz="2400" b="0" i="0" u="none" strike="noStrike" kern="0" cap="none" spc="0" normalizeH="0" baseline="0" noProof="0" dirty="0">
-                <a:ln>
-                  <a:noFill/>
-                </a:ln>
-                <a:solidFill>
-                  <a:prstClr val="black"/>
-                </a:solidFill>
-                <a:effectLst/>
-                <a:uLnTx/>
-                <a:uFillTx/>
-                <a:latin typeface="Calibri" panose="020F0502020204030204"/>
-                <a:ea typeface="+mn-ea"/>
-                <a:cs typeface="+mn-cs"/>
-              </a:rPr>
-              <a:t> </a:t>
-            </a:r>
-            <a:r>
               <a:rPr kumimoji="0" lang="en-US" b="0" i="1" u="none" strike="noStrike" kern="0" cap="none" spc="0" normalizeH="0" baseline="0" noProof="0" dirty="0">
                 <a:ln>
                   <a:noFill/>
@@ -12503,7 +12443,7 @@
                 <a:ea typeface="+mn-ea"/>
                 <a:cs typeface="+mn-cs"/>
               </a:rPr>
-              <a:t>Certificate Authority</a:t>
+              <a:t>Consent Management</a:t>
             </a:r>
           </a:p>
           <a:p>
@@ -12525,40 +12465,6 @@
               <a:defRPr/>
             </a:pPr>
             <a:r>
-              <a:rPr kumimoji="0" lang="en-US" sz="2400" b="1" i="0" u="none" strike="noStrike" kern="0" cap="none" spc="0" normalizeH="0" baseline="0" noProof="0" dirty="0">
-                <a:ln>
-                  <a:noFill/>
-                </a:ln>
-                <a:solidFill>
-                  <a:prstClr val="black"/>
-                </a:solidFill>
-                <a:effectLst/>
-                <a:uLnTx/>
-                <a:uFillTx/>
-                <a:latin typeface="Calibri" panose="020F0502020204030204"/>
-                <a:ea typeface="+mn-ea"/>
-                <a:cs typeface="+mn-cs"/>
-              </a:rPr>
-              <a:t>CT</a:t>
-            </a:r>
-            <a:r>
-              <a:rPr kumimoji="0" lang="en-US" sz="2400" b="0" i="0" u="none" strike="noStrike" kern="0" cap="none" spc="0" normalizeH="0" baseline="0" noProof="0" dirty="0">
-                <a:ln>
-                  <a:noFill/>
-                </a:ln>
-                <a:solidFill>
-                  <a:prstClr val="black"/>
-                </a:solidFill>
-                <a:effectLst/>
-                <a:uLnTx/>
-                <a:uFillTx/>
-                <a:latin typeface="Calibri" panose="020F0502020204030204"/>
-                <a:ea typeface="+mn-ea"/>
-                <a:cs typeface="+mn-cs"/>
-              </a:rPr>
-              <a:t> </a:t>
-            </a:r>
-            <a:r>
               <a:rPr kumimoji="0" lang="en-US" b="0" i="1" u="none" strike="noStrike" kern="0" cap="none" spc="0" normalizeH="0" baseline="0" noProof="0" dirty="0">
                 <a:ln>
                   <a:noFill/>
@@ -12573,7 +12479,7 @@
                 <a:ea typeface="+mn-ea"/>
                 <a:cs typeface="+mn-cs"/>
               </a:rPr>
-              <a:t>Time Service</a:t>
+              <a:t>Certificate Authority</a:t>
             </a:r>
           </a:p>
           <a:p>
@@ -12595,40 +12501,6 @@
               <a:defRPr/>
             </a:pPr>
             <a:r>
-              <a:rPr kumimoji="0" lang="en-US" sz="2400" b="1" i="0" u="none" strike="noStrike" kern="0" cap="none" spc="0" normalizeH="0" baseline="0" noProof="0" dirty="0">
-                <a:ln>
-                  <a:noFill/>
-                </a:ln>
-                <a:solidFill>
-                  <a:prstClr val="black"/>
-                </a:solidFill>
-                <a:effectLst/>
-                <a:uLnTx/>
-                <a:uFillTx/>
-                <a:latin typeface="Calibri" panose="020F0502020204030204"/>
-                <a:ea typeface="+mn-ea"/>
-                <a:cs typeface="+mn-cs"/>
-              </a:rPr>
-              <a:t>PMIR</a:t>
-            </a:r>
-            <a:r>
-              <a:rPr kumimoji="0" lang="en-US" sz="2400" b="0" i="0" u="none" strike="noStrike" kern="0" cap="none" spc="0" normalizeH="0" baseline="0" noProof="0" dirty="0">
-                <a:ln>
-                  <a:noFill/>
-                </a:ln>
-                <a:solidFill>
-                  <a:prstClr val="black"/>
-                </a:solidFill>
-                <a:effectLst/>
-                <a:uLnTx/>
-                <a:uFillTx/>
-                <a:latin typeface="Calibri" panose="020F0502020204030204"/>
-                <a:ea typeface="+mn-ea"/>
-                <a:cs typeface="+mn-cs"/>
-              </a:rPr>
-              <a:t> </a:t>
-            </a:r>
-            <a:r>
               <a:rPr kumimoji="0" lang="en-US" b="0" i="1" u="none" strike="noStrike" kern="0" cap="none" spc="0" normalizeH="0" baseline="0" noProof="0" dirty="0">
                 <a:ln>
                   <a:noFill/>
@@ -12643,31 +12515,8 @@
                 <a:ea typeface="+mn-ea"/>
                 <a:cs typeface="+mn-cs"/>
               </a:rPr>
-              <a:t>Patient </a:t>
-            </a:r>
-            <a:r>
-              <a:rPr lang="en-US" i="1" kern="0" dirty="0">
-                <a:solidFill>
-                  <a:prstClr val="black"/>
-                </a:solidFill>
-                <a:latin typeface="Calibri" panose="020F0502020204030204"/>
-              </a:rPr>
-              <a:t>Id Management</a:t>
-            </a:r>
-            <a:endParaRPr kumimoji="0" lang="en-US" b="0" i="1" u="none" strike="noStrike" kern="0" cap="none" spc="0" normalizeH="0" baseline="0" noProof="0" dirty="0">
-              <a:ln>
-                <a:noFill/>
-              </a:ln>
-              <a:solidFill>
-                <a:prstClr val="black"/>
-              </a:solidFill>
-              <a:effectLst/>
-              <a:uLnTx/>
-              <a:uFillTx/>
-              <a:latin typeface="Calibri" panose="020F0502020204030204"/>
-              <a:ea typeface="+mn-ea"/>
-              <a:cs typeface="+mn-cs"/>
-            </a:endParaRPr>
+              <a:t>Time Service</a:t>
+            </a:r>
           </a:p>
           <a:p>
             <a:pPr marL="0" marR="0" lvl="0" indent="0" algn="ctr" defTabSz="914400" eaLnBrk="1" fontAlgn="auto" latinLnBrk="0" hangingPunct="1">
@@ -12688,23 +12537,6 @@
               <a:defRPr/>
             </a:pPr>
             <a:r>
-              <a:rPr kumimoji="0" lang="en-US" sz="2400" b="1" i="0" u="none" strike="noStrike" kern="0" cap="none" spc="0" normalizeH="0" baseline="0" noProof="0" dirty="0">
-                <a:ln>
-                  <a:noFill/>
-                </a:ln>
-                <a:solidFill>
-                  <a:prstClr val="black"/>
-                </a:solidFill>
-                <a:effectLst/>
-                <a:uLnTx/>
-                <a:uFillTx/>
-                <a:latin typeface="Calibri" panose="020F0502020204030204"/>
-                <a:ea typeface="+mn-ea"/>
-                <a:cs typeface="+mn-cs"/>
-              </a:rPr>
-              <a:t>SVCM </a:t>
-            </a:r>
-            <a:r>
               <a:rPr kumimoji="0" lang="en-US" b="0" i="1" u="none" strike="noStrike" kern="0" cap="none" spc="0" normalizeH="0" baseline="0" noProof="0" dirty="0">
                 <a:ln>
                   <a:noFill/>
@@ -12719,8 +12551,31 @@
                 <a:ea typeface="+mn-ea"/>
                 <a:cs typeface="+mn-cs"/>
               </a:rPr>
-              <a:t>Vocab Management</a:t>
-            </a:r>
+              <a:t>Patient </a:t>
+            </a:r>
+            <a:r>
+              <a:rPr lang="en-US" i="1" kern="0" dirty="0">
+                <a:solidFill>
+                  <a:prstClr val="black"/>
+                </a:solidFill>
+                <a:latin typeface="Calibri" panose="020F0502020204030204"/>
+              </a:rPr>
+              <a:t>Id Management</a:t>
+            </a:r>
+            <a:endParaRPr kumimoji="0" lang="en-US" b="0" i="1" u="none" strike="noStrike" kern="0" cap="none" spc="0" normalizeH="0" baseline="0" noProof="0" dirty="0">
+              <a:ln>
+                <a:noFill/>
+              </a:ln>
+              <a:solidFill>
+                <a:prstClr val="black"/>
+              </a:solidFill>
+              <a:effectLst/>
+              <a:uLnTx/>
+              <a:uFillTx/>
+              <a:latin typeface="Calibri" panose="020F0502020204030204"/>
+              <a:ea typeface="+mn-ea"/>
+              <a:cs typeface="+mn-cs"/>
+            </a:endParaRPr>
           </a:p>
           <a:p>
             <a:pPr marL="0" marR="0" lvl="0" indent="0" algn="ctr" defTabSz="914400" eaLnBrk="1" fontAlgn="auto" latinLnBrk="0" hangingPunct="1">
@@ -12741,40 +12596,6 @@
               <a:defRPr/>
             </a:pPr>
             <a:r>
-              <a:rPr kumimoji="0" lang="en-US" sz="2400" b="1" i="0" u="none" strike="noStrike" kern="0" cap="none" spc="0" normalizeH="0" baseline="0" noProof="0" dirty="0">
-                <a:ln>
-                  <a:noFill/>
-                </a:ln>
-                <a:solidFill>
-                  <a:prstClr val="black"/>
-                </a:solidFill>
-                <a:effectLst/>
-                <a:uLnTx/>
-                <a:uFillTx/>
-                <a:latin typeface="Calibri" panose="020F0502020204030204"/>
-                <a:ea typeface="+mn-ea"/>
-                <a:cs typeface="+mn-cs"/>
-              </a:rPr>
-              <a:t>ATNA</a:t>
-            </a:r>
-            <a:r>
-              <a:rPr kumimoji="0" lang="en-US" sz="2400" b="0" i="0" u="none" strike="noStrike" kern="0" cap="none" spc="0" normalizeH="0" baseline="0" noProof="0" dirty="0">
-                <a:ln>
-                  <a:noFill/>
-                </a:ln>
-                <a:solidFill>
-                  <a:prstClr val="black"/>
-                </a:solidFill>
-                <a:effectLst/>
-                <a:uLnTx/>
-                <a:uFillTx/>
-                <a:latin typeface="Calibri" panose="020F0502020204030204"/>
-                <a:ea typeface="+mn-ea"/>
-                <a:cs typeface="+mn-cs"/>
-              </a:rPr>
-              <a:t> </a:t>
-            </a:r>
-            <a:r>
               <a:rPr kumimoji="0" lang="en-US" b="0" i="1" u="none" strike="noStrike" kern="0" cap="none" spc="0" normalizeH="0" baseline="0" noProof="0" dirty="0">
                 <a:ln>
                   <a:noFill/>
@@ -12789,7 +12610,7 @@
                 <a:ea typeface="+mn-ea"/>
                 <a:cs typeface="+mn-cs"/>
               </a:rPr>
-              <a:t>Audit Record Repository</a:t>
+              <a:t>Vocabulary Management</a:t>
             </a:r>
           </a:p>
           <a:p>
@@ -12811,7 +12632,7 @@
               <a:defRPr/>
             </a:pPr>
             <a:r>
-              <a:rPr kumimoji="0" lang="en-US" sz="2400" b="1" i="0" u="none" strike="noStrike" kern="0" cap="none" spc="0" normalizeH="0" baseline="0" noProof="0" dirty="0">
+              <a:rPr kumimoji="0" lang="en-US" b="0" i="1" u="none" strike="noStrike" kern="0" cap="none" spc="0" normalizeH="0" baseline="0" noProof="0" dirty="0">
                 <a:ln>
                   <a:noFill/>
                 </a:ln>
@@ -12825,25 +12646,27 @@
                 <a:ea typeface="+mn-ea"/>
                 <a:cs typeface="+mn-cs"/>
               </a:rPr>
-              <a:t>mCSD</a:t>
-            </a:r>
-            <a:r>
-              <a:rPr kumimoji="0" lang="en-US" sz="2400" b="0" i="0" u="none" strike="noStrike" kern="0" cap="none" spc="0" normalizeH="0" baseline="0" noProof="0" dirty="0">
-                <a:ln>
-                  <a:noFill/>
-                </a:ln>
-                <a:solidFill>
-                  <a:prstClr val="black"/>
-                </a:solidFill>
-                <a:effectLst/>
-                <a:uLnTx/>
-                <a:uFillTx/>
-                <a:latin typeface="Calibri" panose="020F0502020204030204"/>
-                <a:ea typeface="+mn-ea"/>
-                <a:cs typeface="+mn-cs"/>
-              </a:rPr>
-              <a:t> </a:t>
-            </a:r>
+              <a:t>Audit Record Repository</a:t>
+            </a:r>
+          </a:p>
+          <a:p>
+            <a:pPr marL="0" marR="0" lvl="0" indent="0" algn="ctr" defTabSz="914400" eaLnBrk="1" fontAlgn="auto" latinLnBrk="0" hangingPunct="1">
+              <a:lnSpc>
+                <a:spcPct val="100000"/>
+              </a:lnSpc>
+              <a:spcBef>
+                <a:spcPts val="0"/>
+              </a:spcBef>
+              <a:spcAft>
+                <a:spcPts val="0"/>
+              </a:spcAft>
+              <a:buClrTx/>
+              <a:buSzTx/>
+              <a:buFontTx/>
+              <a:buNone/>
+              <a:tabLst/>
+              <a:defRPr/>
+            </a:pPr>
             <a:r>
               <a:rPr kumimoji="0" lang="en-US" b="0" i="1" u="none" strike="noStrike" kern="0" cap="none" spc="0" normalizeH="0" baseline="0" noProof="0" dirty="0">
                 <a:ln>

</xml_diff>